<commit_message>
Update the CQRS illustré workflow (the event part)
</commit_message>
<xml_diff>
--- a/french/DecouvrirCQRSparLaPratique.pptx
+++ b/french/DecouvrirCQRSparLaPratique.pptx
@@ -392,6 +392,11 @@
                 </a:contourClr>
               </a:sp3d>
             </c:spPr>
+            <c:extLst>
+              <c:ext xmlns:c16="http://schemas.microsoft.com/office/drawing/2014/chart" uri="{C3380CC4-5D6E-409C-BE32-E72D297353CC}">
+                <c16:uniqueId val="{00000009-AEE4-4011-BCF2-00EDA8FF867A}"/>
+              </c:ext>
+            </c:extLst>
           </c:dPt>
           <c:dLbls>
             <c:dLbl>
@@ -18110,6 +18115,110 @@
           </a:p>
         </p:txBody>
       </p:sp>
+      <p:grpSp>
+        <p:nvGrpSpPr>
+          <p:cNvPr id="2" name="Group 1"/>
+          <p:cNvGrpSpPr/>
+          <p:nvPr/>
+        </p:nvGrpSpPr>
+        <p:grpSpPr>
+          <a:xfrm>
+            <a:off x="1888482" y="2710326"/>
+            <a:ext cx="3044761" cy="2310913"/>
+            <a:chOff x="1888482" y="2710326"/>
+            <a:chExt cx="3044761" cy="2310913"/>
+          </a:xfrm>
+        </p:grpSpPr>
+        <p:pic>
+          <p:nvPicPr>
+            <p:cNvPr id="18" name="Picture 2" descr="directory"/>
+            <p:cNvPicPr>
+              <a:picLocks noChangeAspect="1" noChangeArrowheads="1"/>
+            </p:cNvPicPr>
+            <p:nvPr/>
+          </p:nvPicPr>
+          <p:blipFill rotWithShape="1">
+            <a:blip r:embed="rId6">
+              <a:extLst>
+                <a:ext uri="{28A0092B-C50C-407E-A947-70E740481C1C}">
+                  <a14:useLocalDpi xmlns:a14="http://schemas.microsoft.com/office/drawing/2010/main" val="0"/>
+                </a:ext>
+              </a:extLst>
+            </a:blip>
+            <a:srcRect l="12815" t="31177" r="65259" b="27220"/>
+            <a:stretch/>
+          </p:blipFill>
+          <p:spPr bwMode="auto">
+            <a:xfrm>
+              <a:off x="3499556" y="2710326"/>
+              <a:ext cx="1433687" cy="1985851"/>
+            </a:xfrm>
+            <a:prstGeom prst="rect">
+              <a:avLst/>
+            </a:prstGeom>
+            <a:noFill/>
+            <a:extLst>
+              <a:ext uri="{909E8E84-426E-40DD-AFC4-6F175D3DCCD1}">
+                <a14:hiddenFill xmlns:a14="http://schemas.microsoft.com/office/drawing/2010/main">
+                  <a:solidFill>
+                    <a:srgbClr val="FFFFFF"/>
+                  </a:solidFill>
+                </a14:hiddenFill>
+              </a:ext>
+            </a:extLst>
+          </p:spPr>
+        </p:pic>
+        <p:sp>
+          <p:nvSpPr>
+            <p:cNvPr id="20" name="Rectangle 19"/>
+            <p:cNvSpPr/>
+            <p:nvPr/>
+          </p:nvSpPr>
+          <p:spPr>
+            <a:xfrm>
+              <a:off x="1888482" y="2710326"/>
+              <a:ext cx="1611073" cy="2310913"/>
+            </a:xfrm>
+            <a:prstGeom prst="rect">
+              <a:avLst/>
+            </a:prstGeom>
+            <a:solidFill>
+              <a:schemeClr val="bg1"/>
+            </a:solidFill>
+            <a:ln>
+              <a:noFill/>
+            </a:ln>
+          </p:spPr>
+          <p:style>
+            <a:lnRef idx="2">
+              <a:schemeClr val="accent1">
+                <a:shade val="50000"/>
+              </a:schemeClr>
+            </a:lnRef>
+            <a:fillRef idx="1">
+              <a:schemeClr val="accent1"/>
+            </a:fillRef>
+            <a:effectRef idx="0">
+              <a:schemeClr val="accent1"/>
+            </a:effectRef>
+            <a:fontRef idx="minor">
+              <a:schemeClr val="lt1"/>
+            </a:fontRef>
+          </p:style>
+          <p:txBody>
+            <a:bodyPr rtlCol="0" anchor="ctr"/>
+            <a:lstStyle/>
+            <a:p>
+              <a:pPr algn="ctr"/>
+              <a:endParaRPr lang="fr-FR" dirty="0">
+                <a:solidFill>
+                  <a:schemeClr val="tx2"/>
+                </a:solidFill>
+              </a:endParaRPr>
+            </a:p>
+          </p:txBody>
+        </p:sp>
+      </p:grpSp>
     </p:spTree>
     <p:extLst>
       <p:ext uri="{BB962C8B-B14F-4D97-AF65-F5344CB8AC3E}">
@@ -18576,6 +18685,110 @@
           </a:p>
         </p:txBody>
       </p:sp>
+      <p:grpSp>
+        <p:nvGrpSpPr>
+          <p:cNvPr id="17" name="Group 16"/>
+          <p:cNvGrpSpPr/>
+          <p:nvPr/>
+        </p:nvGrpSpPr>
+        <p:grpSpPr>
+          <a:xfrm>
+            <a:off x="1888482" y="2721615"/>
+            <a:ext cx="3044761" cy="2310913"/>
+            <a:chOff x="1888482" y="2710326"/>
+            <a:chExt cx="3044761" cy="2310913"/>
+          </a:xfrm>
+        </p:grpSpPr>
+        <p:pic>
+          <p:nvPicPr>
+            <p:cNvPr id="19" name="Picture 2" descr="directory"/>
+            <p:cNvPicPr>
+              <a:picLocks noChangeAspect="1" noChangeArrowheads="1"/>
+            </p:cNvPicPr>
+            <p:nvPr/>
+          </p:nvPicPr>
+          <p:blipFill rotWithShape="1">
+            <a:blip r:embed="rId6">
+              <a:extLst>
+                <a:ext uri="{28A0092B-C50C-407E-A947-70E740481C1C}">
+                  <a14:useLocalDpi xmlns:a14="http://schemas.microsoft.com/office/drawing/2010/main" val="0"/>
+                </a:ext>
+              </a:extLst>
+            </a:blip>
+            <a:srcRect l="12815" t="31177" r="65259" b="27220"/>
+            <a:stretch/>
+          </p:blipFill>
+          <p:spPr bwMode="auto">
+            <a:xfrm>
+              <a:off x="3499556" y="2710326"/>
+              <a:ext cx="1433687" cy="1985851"/>
+            </a:xfrm>
+            <a:prstGeom prst="rect">
+              <a:avLst/>
+            </a:prstGeom>
+            <a:noFill/>
+            <a:extLst>
+              <a:ext uri="{909E8E84-426E-40DD-AFC4-6F175D3DCCD1}">
+                <a14:hiddenFill xmlns:a14="http://schemas.microsoft.com/office/drawing/2010/main">
+                  <a:solidFill>
+                    <a:srgbClr val="FFFFFF"/>
+                  </a:solidFill>
+                </a14:hiddenFill>
+              </a:ext>
+            </a:extLst>
+          </p:spPr>
+        </p:pic>
+        <p:sp>
+          <p:nvSpPr>
+            <p:cNvPr id="20" name="Rectangle 19"/>
+            <p:cNvSpPr/>
+            <p:nvPr/>
+          </p:nvSpPr>
+          <p:spPr>
+            <a:xfrm>
+              <a:off x="1888482" y="2710326"/>
+              <a:ext cx="1611073" cy="2310913"/>
+            </a:xfrm>
+            <a:prstGeom prst="rect">
+              <a:avLst/>
+            </a:prstGeom>
+            <a:solidFill>
+              <a:schemeClr val="bg1"/>
+            </a:solidFill>
+            <a:ln>
+              <a:noFill/>
+            </a:ln>
+          </p:spPr>
+          <p:style>
+            <a:lnRef idx="2">
+              <a:schemeClr val="accent1">
+                <a:shade val="50000"/>
+              </a:schemeClr>
+            </a:lnRef>
+            <a:fillRef idx="1">
+              <a:schemeClr val="accent1"/>
+            </a:fillRef>
+            <a:effectRef idx="0">
+              <a:schemeClr val="accent1"/>
+            </a:effectRef>
+            <a:fontRef idx="minor">
+              <a:schemeClr val="lt1"/>
+            </a:fontRef>
+          </p:style>
+          <p:txBody>
+            <a:bodyPr rtlCol="0" anchor="ctr"/>
+            <a:lstStyle/>
+            <a:p>
+              <a:pPr algn="ctr"/>
+              <a:endParaRPr lang="fr-FR" dirty="0">
+                <a:solidFill>
+                  <a:schemeClr val="tx2"/>
+                </a:solidFill>
+              </a:endParaRPr>
+            </a:p>
+          </p:txBody>
+        </p:sp>
+      </p:grpSp>
     </p:spTree>
     <p:extLst>
       <p:ext uri="{BB962C8B-B14F-4D97-AF65-F5344CB8AC3E}">
@@ -19103,6 +19316,110 @@
           </a:p>
         </p:txBody>
       </p:sp>
+      <p:grpSp>
+        <p:nvGrpSpPr>
+          <p:cNvPr id="17" name="Group 16"/>
+          <p:cNvGrpSpPr/>
+          <p:nvPr/>
+        </p:nvGrpSpPr>
+        <p:grpSpPr>
+          <a:xfrm>
+            <a:off x="1888482" y="2710326"/>
+            <a:ext cx="3044761" cy="2310913"/>
+            <a:chOff x="1888482" y="2710326"/>
+            <a:chExt cx="3044761" cy="2310913"/>
+          </a:xfrm>
+        </p:grpSpPr>
+        <p:pic>
+          <p:nvPicPr>
+            <p:cNvPr id="19" name="Picture 2" descr="directory"/>
+            <p:cNvPicPr>
+              <a:picLocks noChangeAspect="1" noChangeArrowheads="1"/>
+            </p:cNvPicPr>
+            <p:nvPr/>
+          </p:nvPicPr>
+          <p:blipFill rotWithShape="1">
+            <a:blip r:embed="rId6">
+              <a:extLst>
+                <a:ext uri="{28A0092B-C50C-407E-A947-70E740481C1C}">
+                  <a14:useLocalDpi xmlns:a14="http://schemas.microsoft.com/office/drawing/2010/main" val="0"/>
+                </a:ext>
+              </a:extLst>
+            </a:blip>
+            <a:srcRect l="12815" t="31177" r="65259" b="27220"/>
+            <a:stretch/>
+          </p:blipFill>
+          <p:spPr bwMode="auto">
+            <a:xfrm>
+              <a:off x="3499556" y="2710326"/>
+              <a:ext cx="1433687" cy="1985851"/>
+            </a:xfrm>
+            <a:prstGeom prst="rect">
+              <a:avLst/>
+            </a:prstGeom>
+            <a:noFill/>
+            <a:extLst>
+              <a:ext uri="{909E8E84-426E-40DD-AFC4-6F175D3DCCD1}">
+                <a14:hiddenFill xmlns:a14="http://schemas.microsoft.com/office/drawing/2010/main">
+                  <a:solidFill>
+                    <a:srgbClr val="FFFFFF"/>
+                  </a:solidFill>
+                </a14:hiddenFill>
+              </a:ext>
+            </a:extLst>
+          </p:spPr>
+        </p:pic>
+        <p:sp>
+          <p:nvSpPr>
+            <p:cNvPr id="20" name="Rectangle 19"/>
+            <p:cNvSpPr/>
+            <p:nvPr/>
+          </p:nvSpPr>
+          <p:spPr>
+            <a:xfrm>
+              <a:off x="1888482" y="2710326"/>
+              <a:ext cx="1611073" cy="2310913"/>
+            </a:xfrm>
+            <a:prstGeom prst="rect">
+              <a:avLst/>
+            </a:prstGeom>
+            <a:solidFill>
+              <a:schemeClr val="bg1"/>
+            </a:solidFill>
+            <a:ln>
+              <a:noFill/>
+            </a:ln>
+          </p:spPr>
+          <p:style>
+            <a:lnRef idx="2">
+              <a:schemeClr val="accent1">
+                <a:shade val="50000"/>
+              </a:schemeClr>
+            </a:lnRef>
+            <a:fillRef idx="1">
+              <a:schemeClr val="accent1"/>
+            </a:fillRef>
+            <a:effectRef idx="0">
+              <a:schemeClr val="accent1"/>
+            </a:effectRef>
+            <a:fontRef idx="minor">
+              <a:schemeClr val="lt1"/>
+            </a:fontRef>
+          </p:style>
+          <p:txBody>
+            <a:bodyPr rtlCol="0" anchor="ctr"/>
+            <a:lstStyle/>
+            <a:p>
+              <a:pPr algn="ctr"/>
+              <a:endParaRPr lang="fr-FR" dirty="0">
+                <a:solidFill>
+                  <a:schemeClr val="tx2"/>
+                </a:solidFill>
+              </a:endParaRPr>
+            </a:p>
+          </p:txBody>
+        </p:sp>
+      </p:grpSp>
     </p:spTree>
     <p:extLst>
       <p:ext uri="{BB962C8B-B14F-4D97-AF65-F5344CB8AC3E}">
@@ -19404,6 +19721,110 @@
           </a:p>
         </p:txBody>
       </p:sp>
+      <p:grpSp>
+        <p:nvGrpSpPr>
+          <p:cNvPr id="12" name="Group 11"/>
+          <p:cNvGrpSpPr/>
+          <p:nvPr/>
+        </p:nvGrpSpPr>
+        <p:grpSpPr>
+          <a:xfrm>
+            <a:off x="1888482" y="2710326"/>
+            <a:ext cx="3044761" cy="2310913"/>
+            <a:chOff x="1888482" y="2710326"/>
+            <a:chExt cx="3044761" cy="2310913"/>
+          </a:xfrm>
+        </p:grpSpPr>
+        <p:pic>
+          <p:nvPicPr>
+            <p:cNvPr id="13" name="Picture 2" descr="directory"/>
+            <p:cNvPicPr>
+              <a:picLocks noChangeAspect="1" noChangeArrowheads="1"/>
+            </p:cNvPicPr>
+            <p:nvPr/>
+          </p:nvPicPr>
+          <p:blipFill rotWithShape="1">
+            <a:blip r:embed="rId6">
+              <a:extLst>
+                <a:ext uri="{28A0092B-C50C-407E-A947-70E740481C1C}">
+                  <a14:useLocalDpi xmlns:a14="http://schemas.microsoft.com/office/drawing/2010/main" val="0"/>
+                </a:ext>
+              </a:extLst>
+            </a:blip>
+            <a:srcRect l="12815" t="31177" r="65259" b="27220"/>
+            <a:stretch/>
+          </p:blipFill>
+          <p:spPr bwMode="auto">
+            <a:xfrm>
+              <a:off x="3499556" y="2710326"/>
+              <a:ext cx="1433687" cy="1985851"/>
+            </a:xfrm>
+            <a:prstGeom prst="rect">
+              <a:avLst/>
+            </a:prstGeom>
+            <a:noFill/>
+            <a:extLst>
+              <a:ext uri="{909E8E84-426E-40DD-AFC4-6F175D3DCCD1}">
+                <a14:hiddenFill xmlns:a14="http://schemas.microsoft.com/office/drawing/2010/main">
+                  <a:solidFill>
+                    <a:srgbClr val="FFFFFF"/>
+                  </a:solidFill>
+                </a14:hiddenFill>
+              </a:ext>
+            </a:extLst>
+          </p:spPr>
+        </p:pic>
+        <p:sp>
+          <p:nvSpPr>
+            <p:cNvPr id="14" name="Rectangle 13"/>
+            <p:cNvSpPr/>
+            <p:nvPr/>
+          </p:nvSpPr>
+          <p:spPr>
+            <a:xfrm>
+              <a:off x="1888482" y="2710326"/>
+              <a:ext cx="1611073" cy="2310913"/>
+            </a:xfrm>
+            <a:prstGeom prst="rect">
+              <a:avLst/>
+            </a:prstGeom>
+            <a:solidFill>
+              <a:schemeClr val="bg1"/>
+            </a:solidFill>
+            <a:ln>
+              <a:noFill/>
+            </a:ln>
+          </p:spPr>
+          <p:style>
+            <a:lnRef idx="2">
+              <a:schemeClr val="accent1">
+                <a:shade val="50000"/>
+              </a:schemeClr>
+            </a:lnRef>
+            <a:fillRef idx="1">
+              <a:schemeClr val="accent1"/>
+            </a:fillRef>
+            <a:effectRef idx="0">
+              <a:schemeClr val="accent1"/>
+            </a:effectRef>
+            <a:fontRef idx="minor">
+              <a:schemeClr val="lt1"/>
+            </a:fontRef>
+          </p:style>
+          <p:txBody>
+            <a:bodyPr rtlCol="0" anchor="ctr"/>
+            <a:lstStyle/>
+            <a:p>
+              <a:pPr algn="ctr"/>
+              <a:endParaRPr lang="fr-FR" dirty="0">
+                <a:solidFill>
+                  <a:schemeClr val="tx2"/>
+                </a:solidFill>
+              </a:endParaRPr>
+            </a:p>
+          </p:txBody>
+        </p:sp>
+      </p:grpSp>
     </p:spTree>
     <p:extLst>
       <p:ext uri="{BB962C8B-B14F-4D97-AF65-F5344CB8AC3E}">
@@ -19733,6 +20154,110 @@
           </a:p>
         </p:txBody>
       </p:sp>
+      <p:grpSp>
+        <p:nvGrpSpPr>
+          <p:cNvPr id="12" name="Group 11"/>
+          <p:cNvGrpSpPr/>
+          <p:nvPr/>
+        </p:nvGrpSpPr>
+        <p:grpSpPr>
+          <a:xfrm>
+            <a:off x="1888482" y="2710326"/>
+            <a:ext cx="3044761" cy="2310913"/>
+            <a:chOff x="1888482" y="2710326"/>
+            <a:chExt cx="3044761" cy="2310913"/>
+          </a:xfrm>
+        </p:grpSpPr>
+        <p:pic>
+          <p:nvPicPr>
+            <p:cNvPr id="13" name="Picture 2" descr="directory"/>
+            <p:cNvPicPr>
+              <a:picLocks noChangeAspect="1" noChangeArrowheads="1"/>
+            </p:cNvPicPr>
+            <p:nvPr/>
+          </p:nvPicPr>
+          <p:blipFill rotWithShape="1">
+            <a:blip r:embed="rId6">
+              <a:extLst>
+                <a:ext uri="{28A0092B-C50C-407E-A947-70E740481C1C}">
+                  <a14:useLocalDpi xmlns:a14="http://schemas.microsoft.com/office/drawing/2010/main" val="0"/>
+                </a:ext>
+              </a:extLst>
+            </a:blip>
+            <a:srcRect l="12815" t="31177" r="65259" b="27220"/>
+            <a:stretch/>
+          </p:blipFill>
+          <p:spPr bwMode="auto">
+            <a:xfrm>
+              <a:off x="3499556" y="2710326"/>
+              <a:ext cx="1433687" cy="1985851"/>
+            </a:xfrm>
+            <a:prstGeom prst="rect">
+              <a:avLst/>
+            </a:prstGeom>
+            <a:noFill/>
+            <a:extLst>
+              <a:ext uri="{909E8E84-426E-40DD-AFC4-6F175D3DCCD1}">
+                <a14:hiddenFill xmlns:a14="http://schemas.microsoft.com/office/drawing/2010/main">
+                  <a:solidFill>
+                    <a:srgbClr val="FFFFFF"/>
+                  </a:solidFill>
+                </a14:hiddenFill>
+              </a:ext>
+            </a:extLst>
+          </p:spPr>
+        </p:pic>
+        <p:sp>
+          <p:nvSpPr>
+            <p:cNvPr id="14" name="Rectangle 13"/>
+            <p:cNvSpPr/>
+            <p:nvPr/>
+          </p:nvSpPr>
+          <p:spPr>
+            <a:xfrm>
+              <a:off x="1888482" y="2710326"/>
+              <a:ext cx="1611073" cy="2310913"/>
+            </a:xfrm>
+            <a:prstGeom prst="rect">
+              <a:avLst/>
+            </a:prstGeom>
+            <a:solidFill>
+              <a:schemeClr val="bg1"/>
+            </a:solidFill>
+            <a:ln>
+              <a:noFill/>
+            </a:ln>
+          </p:spPr>
+          <p:style>
+            <a:lnRef idx="2">
+              <a:schemeClr val="accent1">
+                <a:shade val="50000"/>
+              </a:schemeClr>
+            </a:lnRef>
+            <a:fillRef idx="1">
+              <a:schemeClr val="accent1"/>
+            </a:fillRef>
+            <a:effectRef idx="0">
+              <a:schemeClr val="accent1"/>
+            </a:effectRef>
+            <a:fontRef idx="minor">
+              <a:schemeClr val="lt1"/>
+            </a:fontRef>
+          </p:style>
+          <p:txBody>
+            <a:bodyPr rtlCol="0" anchor="ctr"/>
+            <a:lstStyle/>
+            <a:p>
+              <a:pPr algn="ctr"/>
+              <a:endParaRPr lang="fr-FR" dirty="0">
+                <a:solidFill>
+                  <a:schemeClr val="tx2"/>
+                </a:solidFill>
+              </a:endParaRPr>
+            </a:p>
+          </p:txBody>
+        </p:sp>
+      </p:grpSp>
     </p:spTree>
     <p:extLst>
       <p:ext uri="{BB962C8B-B14F-4D97-AF65-F5344CB8AC3E}">
@@ -21190,6 +21715,47 @@
           </a:p>
         </p:txBody>
       </p:sp>
+      <p:pic>
+        <p:nvPicPr>
+          <p:cNvPr id="6" name="Picture 4" descr="Afficher l'image d'origine"/>
+          <p:cNvPicPr>
+            <a:picLocks noChangeAspect="1" noChangeArrowheads="1"/>
+          </p:cNvPicPr>
+          <p:nvPr/>
+        </p:nvPicPr>
+        <p:blipFill>
+          <a:blip r:embed="rId3">
+            <a:extLst>
+              <a:ext uri="{28A0092B-C50C-407E-A947-70E740481C1C}">
+                <a14:useLocalDpi xmlns:a14="http://schemas.microsoft.com/office/drawing/2010/main" val="0"/>
+              </a:ext>
+            </a:extLst>
+          </a:blip>
+          <a:srcRect/>
+          <a:stretch>
+            <a:fillRect/>
+          </a:stretch>
+        </p:blipFill>
+        <p:spPr bwMode="auto">
+          <a:xfrm>
+            <a:off x="4496372" y="1162947"/>
+            <a:ext cx="3199255" cy="627025"/>
+          </a:xfrm>
+          <a:prstGeom prst="rect">
+            <a:avLst/>
+          </a:prstGeom>
+          <a:noFill/>
+          <a:extLst>
+            <a:ext uri="{909E8E84-426E-40DD-AFC4-6F175D3DCCD1}">
+              <a14:hiddenFill xmlns:a14="http://schemas.microsoft.com/office/drawing/2010/main">
+                <a:solidFill>
+                  <a:srgbClr val="FFFFFF"/>
+                </a:solidFill>
+              </a14:hiddenFill>
+            </a:ext>
+          </a:extLst>
+        </p:spPr>
+      </p:pic>
     </p:spTree>
     <p:extLst>
       <p:ext uri="{BB962C8B-B14F-4D97-AF65-F5344CB8AC3E}">
@@ -23584,15 +24150,7 @@
               <a:srgbClr val="C0C0C0"/>
             </a:contourClr>
           </a:sp3d>
-          <a:extLst>
-            <a:ext uri="{909E8E84-426E-40DD-AFC4-6F175D3DCCD1}">
-              <a14:hiddenFill xmlns:a14="http://schemas.microsoft.com/office/drawing/2010/main">
-                <a:solidFill>
-                  <a:srgbClr val="FFFFFF"/>
-                </a:solidFill>
-              </a14:hiddenFill>
-            </a:ext>
-          </a:extLst>
+          <a:extLst/>
         </p:spPr>
       </p:pic>
     </p:spTree>
@@ -24540,15 +25098,6 @@
 </file>
 
 <file path=customXml/item1.xml><?xml version="1.0" encoding="utf-8"?>
-<?mso-contentType ?>
-<FormTemplates xmlns="http://schemas.microsoft.com/sharepoint/v3/contenttype/forms">
-  <Display>DocumentLibraryForm</Display>
-  <Edit>DocumentLibraryForm</Edit>
-  <New>DocumentLibraryForm</New>
-</FormTemplates>
-</file>
-
-<file path=customXml/item2.xml><?xml version="1.0" encoding="utf-8"?>
 <ct:contentTypeSchema xmlns:ct="http://schemas.microsoft.com/office/2006/metadata/contentType" xmlns:ma="http://schemas.microsoft.com/office/2006/metadata/properties/metaAttributes" ct:_="" ma:_="" ma:contentTypeName="Document" ma:contentTypeID="0x010100AA82F50041FC6E4EBC42A700831FF004" ma:contentTypeVersion="4" ma:contentTypeDescription="Crée un document." ma:contentTypeScope="" ma:versionID="4c6ec815f8017e8af2e42809d3015731">
   <xsd:schema xmlns:xsd="http://www.w3.org/2001/XMLSchema" xmlns:xs="http://www.w3.org/2001/XMLSchema" xmlns:p="http://schemas.microsoft.com/office/2006/metadata/properties" xmlns:ns2="fcc931a8-69fd-4b0b-b111-5aa2089df431" xmlns:ns3="248c3350-8f11-4d45-912e-72bccbb754b6" targetNamespace="http://schemas.microsoft.com/office/2006/metadata/properties" ma:root="true" ma:fieldsID="fa4f347ab2845ae3d60427d91a21d39e" ns2:_="" ns3:_="">
     <xsd:import namespace="fcc931a8-69fd-4b0b-b111-5aa2089df431"/>
@@ -24715,6 +25264,15 @@
 </ct:contentTypeSchema>
 </file>
 
+<file path=customXml/item2.xml><?xml version="1.0" encoding="utf-8"?>
+<?mso-contentType ?>
+<FormTemplates xmlns="http://schemas.microsoft.com/sharepoint/v3/contenttype/forms">
+  <Display>DocumentLibraryForm</Display>
+  <Edit>DocumentLibraryForm</Edit>
+  <New>DocumentLibraryForm</New>
+</FormTemplates>
+</file>
+
 <file path=customXml/item3.xml><?xml version="1.0" encoding="utf-8"?>
 <p:properties xmlns:p="http://schemas.microsoft.com/office/2006/metadata/properties" xmlns:xsi="http://www.w3.org/2001/XMLSchema-instance" xmlns:pc="http://schemas.microsoft.com/office/infopath/2007/PartnerControls">
   <documentManagement/>
@@ -24722,14 +25280,6 @@
 </file>
 
 <file path=customXml/itemProps1.xml><?xml version="1.0" encoding="utf-8"?>
-<ds:datastoreItem xmlns:ds="http://schemas.openxmlformats.org/officeDocument/2006/customXml" ds:itemID="{4F22CF26-F779-4CA8-9499-C5BCD4F56499}">
-  <ds:schemaRefs>
-    <ds:schemaRef ds:uri="http://schemas.microsoft.com/sharepoint/v3/contenttype/forms"/>
-  </ds:schemaRefs>
-</ds:datastoreItem>
-</file>
-
-<file path=customXml/itemProps2.xml><?xml version="1.0" encoding="utf-8"?>
 <ds:datastoreItem xmlns:ds="http://schemas.openxmlformats.org/officeDocument/2006/customXml" ds:itemID="{E040B343-BD03-44D2-93AA-0A352731B5B4}">
   <ds:schemaRefs>
     <ds:schemaRef ds:uri="http://schemas.microsoft.com/office/2006/metadata/contentType"/>
@@ -24744,6 +25294,14 @@
     <ds:schemaRef ds:uri="http://purl.org/dc/elements/1.1/"/>
     <ds:schemaRef ds:uri="http://purl.org/dc/terms/"/>
     <ds:schemaRef ds:uri="http://schemas.microsoft.com/internal/obd"/>
+  </ds:schemaRefs>
+</ds:datastoreItem>
+</file>
+
+<file path=customXml/itemProps2.xml><?xml version="1.0" encoding="utf-8"?>
+<ds:datastoreItem xmlns:ds="http://schemas.openxmlformats.org/officeDocument/2006/customXml" ds:itemID="{4F22CF26-F779-4CA8-9499-C5BCD4F56499}">
+  <ds:schemaRefs>
+    <ds:schemaRef ds:uri="http://schemas.microsoft.com/sharepoint/v3/contenttype/forms"/>
   </ds:schemaRefs>
 </ds:datastoreItem>
 </file>

</xml_diff>

<commit_message>
Improve both content (conclusion) and animations
</commit_message>
<xml_diff>
--- a/french/DecouvrirCQRSparLaPratique.pptx
+++ b/french/DecouvrirCQRSparLaPratique.pptx
@@ -5,10 +5,10 @@
     <p:sldMasterId id="2147483648" r:id="rId4"/>
   </p:sldMasterIdLst>
   <p:notesMasterIdLst>
-    <p:notesMasterId r:id="rId49"/>
+    <p:notesMasterId r:id="rId52"/>
   </p:notesMasterIdLst>
   <p:handoutMasterIdLst>
-    <p:handoutMasterId r:id="rId50"/>
+    <p:handoutMasterId r:id="rId53"/>
   </p:handoutMasterIdLst>
   <p:sldIdLst>
     <p:sldId id="257" r:id="rId5"/>
@@ -51,10 +51,13 @@
     <p:sldId id="300" r:id="rId42"/>
     <p:sldId id="301" r:id="rId43"/>
     <p:sldId id="302" r:id="rId44"/>
-    <p:sldId id="263" r:id="rId45"/>
-    <p:sldId id="271" r:id="rId46"/>
-    <p:sldId id="283" r:id="rId47"/>
-    <p:sldId id="284" r:id="rId48"/>
+    <p:sldId id="327" r:id="rId45"/>
+    <p:sldId id="326" r:id="rId46"/>
+    <p:sldId id="325" r:id="rId47"/>
+    <p:sldId id="263" r:id="rId48"/>
+    <p:sldId id="271" r:id="rId49"/>
+    <p:sldId id="283" r:id="rId50"/>
+    <p:sldId id="284" r:id="rId51"/>
   </p:sldIdLst>
   <p:sldSz cx="12192000" cy="6858000"/>
   <p:notesSz cx="6858000" cy="9144000"/>
@@ -202,6 +205,9 @@
             <p14:sldId id="300"/>
             <p14:sldId id="301"/>
             <p14:sldId id="302"/>
+            <p14:sldId id="327"/>
+            <p14:sldId id="326"/>
+            <p14:sldId id="325"/>
           </p14:sldIdLst>
         </p14:section>
         <p14:section name="FIN" id="{801A64D7-7AB9-44D3-974A-2E5C3712FD5F}">
@@ -3944,6 +3950,258 @@
 </p:notes>
 </file>
 
+<file path=ppt/notesSlides/notesSlide34.xml><?xml version="1.0" encoding="utf-8"?>
+<p:notes xmlns:a="http://schemas.openxmlformats.org/drawingml/2006/main" xmlns:r="http://schemas.openxmlformats.org/officeDocument/2006/relationships" xmlns:p="http://schemas.openxmlformats.org/presentationml/2006/main">
+  <p:cSld>
+    <p:spTree>
+      <p:nvGrpSpPr>
+        <p:cNvPr id="1" name=""/>
+        <p:cNvGrpSpPr/>
+        <p:nvPr/>
+      </p:nvGrpSpPr>
+      <p:grpSpPr>
+        <a:xfrm>
+          <a:off x="0" y="0"/>
+          <a:ext cx="0" cy="0"/>
+          <a:chOff x="0" y="0"/>
+          <a:chExt cx="0" cy="0"/>
+        </a:xfrm>
+      </p:grpSpPr>
+      <p:sp>
+        <p:nvSpPr>
+          <p:cNvPr id="2" name="Slide Image Placeholder 1"/>
+          <p:cNvSpPr>
+            <a:spLocks noGrp="1" noRot="1" noChangeAspect="1"/>
+          </p:cNvSpPr>
+          <p:nvPr>
+            <p:ph type="sldImg"/>
+          </p:nvPr>
+        </p:nvSpPr>
+        <p:spPr/>
+      </p:sp>
+      <p:sp>
+        <p:nvSpPr>
+          <p:cNvPr id="3" name="Notes Placeholder 2"/>
+          <p:cNvSpPr>
+            <a:spLocks noGrp="1"/>
+          </p:cNvSpPr>
+          <p:nvPr>
+            <p:ph type="body" idx="1"/>
+          </p:nvPr>
+        </p:nvSpPr>
+        <p:spPr/>
+        <p:txBody>
+          <a:bodyPr/>
+          <a:lstStyle/>
+          <a:p>
+            <a:endParaRPr lang="en-US"/>
+          </a:p>
+        </p:txBody>
+      </p:sp>
+      <p:sp>
+        <p:nvSpPr>
+          <p:cNvPr id="4" name="Slide Number Placeholder 3"/>
+          <p:cNvSpPr>
+            <a:spLocks noGrp="1"/>
+          </p:cNvSpPr>
+          <p:nvPr>
+            <p:ph type="sldNum" sz="quarter" idx="10"/>
+          </p:nvPr>
+        </p:nvSpPr>
+        <p:spPr/>
+        <p:txBody>
+          <a:bodyPr/>
+          <a:lstStyle/>
+          <a:p>
+            <a:fld id="{444FAE70-2102-49E3-ABCF-8EF7285755C6}" type="slidenum">
+              <a:rPr lang="en-US" smtClean="0"/>
+              <a:t>41</a:t>
+            </a:fld>
+            <a:endParaRPr lang="en-US"/>
+          </a:p>
+        </p:txBody>
+      </p:sp>
+    </p:spTree>
+    <p:extLst>
+      <p:ext uri="{BB962C8B-B14F-4D97-AF65-F5344CB8AC3E}">
+        <p14:creationId xmlns:p14="http://schemas.microsoft.com/office/powerpoint/2010/main" val="3423502174"/>
+      </p:ext>
+    </p:extLst>
+  </p:cSld>
+  <p:clrMapOvr>
+    <a:masterClrMapping/>
+  </p:clrMapOvr>
+</p:notes>
+</file>
+
+<file path=ppt/notesSlides/notesSlide35.xml><?xml version="1.0" encoding="utf-8"?>
+<p:notes xmlns:a="http://schemas.openxmlformats.org/drawingml/2006/main" xmlns:r="http://schemas.openxmlformats.org/officeDocument/2006/relationships" xmlns:p="http://schemas.openxmlformats.org/presentationml/2006/main">
+  <p:cSld>
+    <p:spTree>
+      <p:nvGrpSpPr>
+        <p:cNvPr id="1" name=""/>
+        <p:cNvGrpSpPr/>
+        <p:nvPr/>
+      </p:nvGrpSpPr>
+      <p:grpSpPr>
+        <a:xfrm>
+          <a:off x="0" y="0"/>
+          <a:ext cx="0" cy="0"/>
+          <a:chOff x="0" y="0"/>
+          <a:chExt cx="0" cy="0"/>
+        </a:xfrm>
+      </p:grpSpPr>
+      <p:sp>
+        <p:nvSpPr>
+          <p:cNvPr id="2" name="Slide Image Placeholder 1"/>
+          <p:cNvSpPr>
+            <a:spLocks noGrp="1" noRot="1" noChangeAspect="1"/>
+          </p:cNvSpPr>
+          <p:nvPr>
+            <p:ph type="sldImg"/>
+          </p:nvPr>
+        </p:nvSpPr>
+        <p:spPr/>
+      </p:sp>
+      <p:sp>
+        <p:nvSpPr>
+          <p:cNvPr id="3" name="Notes Placeholder 2"/>
+          <p:cNvSpPr>
+            <a:spLocks noGrp="1"/>
+          </p:cNvSpPr>
+          <p:nvPr>
+            <p:ph type="body" idx="1"/>
+          </p:nvPr>
+        </p:nvSpPr>
+        <p:spPr/>
+        <p:txBody>
+          <a:bodyPr/>
+          <a:lstStyle/>
+          <a:p>
+            <a:endParaRPr lang="en-US"/>
+          </a:p>
+        </p:txBody>
+      </p:sp>
+      <p:sp>
+        <p:nvSpPr>
+          <p:cNvPr id="4" name="Slide Number Placeholder 3"/>
+          <p:cNvSpPr>
+            <a:spLocks noGrp="1"/>
+          </p:cNvSpPr>
+          <p:nvPr>
+            <p:ph type="sldNum" sz="quarter" idx="10"/>
+          </p:nvPr>
+        </p:nvSpPr>
+        <p:spPr/>
+        <p:txBody>
+          <a:bodyPr/>
+          <a:lstStyle/>
+          <a:p>
+            <a:fld id="{444FAE70-2102-49E3-ABCF-8EF7285755C6}" type="slidenum">
+              <a:rPr lang="en-US" smtClean="0"/>
+              <a:t>42</a:t>
+            </a:fld>
+            <a:endParaRPr lang="en-US"/>
+          </a:p>
+        </p:txBody>
+      </p:sp>
+    </p:spTree>
+    <p:extLst>
+      <p:ext uri="{BB962C8B-B14F-4D97-AF65-F5344CB8AC3E}">
+        <p14:creationId xmlns:p14="http://schemas.microsoft.com/office/powerpoint/2010/main" val="321428644"/>
+      </p:ext>
+    </p:extLst>
+  </p:cSld>
+  <p:clrMapOvr>
+    <a:masterClrMapping/>
+  </p:clrMapOvr>
+</p:notes>
+</file>
+
+<file path=ppt/notesSlides/notesSlide36.xml><?xml version="1.0" encoding="utf-8"?>
+<p:notes xmlns:a="http://schemas.openxmlformats.org/drawingml/2006/main" xmlns:r="http://schemas.openxmlformats.org/officeDocument/2006/relationships" xmlns:p="http://schemas.openxmlformats.org/presentationml/2006/main">
+  <p:cSld>
+    <p:spTree>
+      <p:nvGrpSpPr>
+        <p:cNvPr id="1" name=""/>
+        <p:cNvGrpSpPr/>
+        <p:nvPr/>
+      </p:nvGrpSpPr>
+      <p:grpSpPr>
+        <a:xfrm>
+          <a:off x="0" y="0"/>
+          <a:ext cx="0" cy="0"/>
+          <a:chOff x="0" y="0"/>
+          <a:chExt cx="0" cy="0"/>
+        </a:xfrm>
+      </p:grpSpPr>
+      <p:sp>
+        <p:nvSpPr>
+          <p:cNvPr id="2" name="Slide Image Placeholder 1"/>
+          <p:cNvSpPr>
+            <a:spLocks noGrp="1" noRot="1" noChangeAspect="1"/>
+          </p:cNvSpPr>
+          <p:nvPr>
+            <p:ph type="sldImg"/>
+          </p:nvPr>
+        </p:nvSpPr>
+        <p:spPr/>
+      </p:sp>
+      <p:sp>
+        <p:nvSpPr>
+          <p:cNvPr id="3" name="Notes Placeholder 2"/>
+          <p:cNvSpPr>
+            <a:spLocks noGrp="1"/>
+          </p:cNvSpPr>
+          <p:nvPr>
+            <p:ph type="body" idx="1"/>
+          </p:nvPr>
+        </p:nvSpPr>
+        <p:spPr/>
+        <p:txBody>
+          <a:bodyPr/>
+          <a:lstStyle/>
+          <a:p>
+            <a:endParaRPr lang="en-US"/>
+          </a:p>
+        </p:txBody>
+      </p:sp>
+      <p:sp>
+        <p:nvSpPr>
+          <p:cNvPr id="4" name="Slide Number Placeholder 3"/>
+          <p:cNvSpPr>
+            <a:spLocks noGrp="1"/>
+          </p:cNvSpPr>
+          <p:nvPr>
+            <p:ph type="sldNum" sz="quarter" idx="10"/>
+          </p:nvPr>
+        </p:nvSpPr>
+        <p:spPr/>
+        <p:txBody>
+          <a:bodyPr/>
+          <a:lstStyle/>
+          <a:p>
+            <a:fld id="{444FAE70-2102-49E3-ABCF-8EF7285755C6}" type="slidenum">
+              <a:rPr lang="en-US" smtClean="0"/>
+              <a:t>43</a:t>
+            </a:fld>
+            <a:endParaRPr lang="en-US"/>
+          </a:p>
+        </p:txBody>
+      </p:sp>
+    </p:spTree>
+    <p:extLst>
+      <p:ext uri="{BB962C8B-B14F-4D97-AF65-F5344CB8AC3E}">
+        <p14:creationId xmlns:p14="http://schemas.microsoft.com/office/powerpoint/2010/main" val="2501111291"/>
+      </p:ext>
+    </p:extLst>
+  </p:cSld>
+  <p:clrMapOvr>
+    <a:masterClrMapping/>
+  </p:clrMapOvr>
+</p:notes>
+</file>
+
 <file path=ppt/notesSlides/notesSlide4.xml><?xml version="1.0" encoding="utf-8"?>
 <p:notes xmlns:a="http://schemas.openxmlformats.org/drawingml/2006/main" xmlns:r="http://schemas.openxmlformats.org/officeDocument/2006/relationships" xmlns:p="http://schemas.openxmlformats.org/presentationml/2006/main">
   <p:cSld>
@@ -6883,7 +7141,7 @@
         </p:nvGrpSpPr>
         <p:grpSpPr>
           <a:xfrm>
-            <a:off x="4248678" y="1511335"/>
+            <a:off x="4248678" y="1086332"/>
             <a:ext cx="7261082" cy="2726118"/>
             <a:chOff x="4248678" y="1511335"/>
             <a:chExt cx="7261082" cy="2726118"/>
@@ -7181,6 +7439,44 @@
           </p:pic>
         </p:grpSp>
       </p:grpSp>
+      <p:cxnSp>
+        <p:nvCxnSpPr>
+          <p:cNvPr id="3" name="Straight Connector 2"/>
+          <p:cNvCxnSpPr/>
+          <p:nvPr/>
+        </p:nvCxnSpPr>
+        <p:spPr>
+          <a:xfrm>
+            <a:off x="1906073" y="1532804"/>
+            <a:ext cx="8036417" cy="4571782"/>
+          </a:xfrm>
+          <a:prstGeom prst="line">
+            <a:avLst/>
+          </a:prstGeom>
+          <a:ln w="44450">
+            <a:solidFill>
+              <a:schemeClr val="bg1">
+                <a:lumMod val="85000"/>
+              </a:schemeClr>
+            </a:solidFill>
+            <a:prstDash val="lgDash"/>
+          </a:ln>
+        </p:spPr>
+        <p:style>
+          <a:lnRef idx="1">
+            <a:schemeClr val="accent1"/>
+          </a:lnRef>
+          <a:fillRef idx="0">
+            <a:schemeClr val="accent1"/>
+          </a:fillRef>
+          <a:effectRef idx="0">
+            <a:schemeClr val="accent1"/>
+          </a:effectRef>
+          <a:fontRef idx="minor">
+            <a:schemeClr val="tx1"/>
+          </a:fontRef>
+        </p:style>
+      </p:cxnSp>
     </p:spTree>
     <p:extLst>
       <p:ext uri="{BB962C8B-B14F-4D97-AF65-F5344CB8AC3E}">
@@ -7226,6 +7522,51 @@
                                         </p:cTn>
                                         <p:tgtEl>
                                           <p:spTgt spid="20"/>
+                                        </p:tgtEl>
+                                        <p:attrNameLst>
+                                          <p:attrName>style.visibility</p:attrName>
+                                        </p:attrNameLst>
+                                      </p:cBhvr>
+                                      <p:to>
+                                        <p:strVal val="visible"/>
+                                      </p:to>
+                                    </p:set>
+                                  </p:childTnLst>
+                                </p:cTn>
+                              </p:par>
+                            </p:childTnLst>
+                          </p:cTn>
+                        </p:par>
+                      </p:childTnLst>
+                    </p:cTn>
+                  </p:par>
+                  <p:par>
+                    <p:cTn id="7" fill="hold">
+                      <p:stCondLst>
+                        <p:cond delay="indefinite"/>
+                      </p:stCondLst>
+                      <p:childTnLst>
+                        <p:par>
+                          <p:cTn id="8" fill="hold">
+                            <p:stCondLst>
+                              <p:cond delay="0"/>
+                            </p:stCondLst>
+                            <p:childTnLst>
+                              <p:par>
+                                <p:cTn id="9" presetID="1" presetClass="entr" presetSubtype="0" fill="hold" nodeType="clickEffect">
+                                  <p:stCondLst>
+                                    <p:cond delay="0"/>
+                                  </p:stCondLst>
+                                  <p:childTnLst>
+                                    <p:set>
+                                      <p:cBhvr>
+                                        <p:cTn id="10" dur="1" fill="hold">
+                                          <p:stCondLst>
+                                            <p:cond delay="0"/>
+                                          </p:stCondLst>
+                                        </p:cTn>
+                                        <p:tgtEl>
+                                          <p:spTgt spid="3"/>
                                         </p:tgtEl>
                                         <p:attrNameLst>
                                           <p:attrName>style.visibility</p:attrName>
@@ -11428,6 +11769,14 @@
 <file path=ppt/slides/slide2.xml><?xml version="1.0" encoding="utf-8"?>
 <p:sld xmlns:a="http://schemas.openxmlformats.org/drawingml/2006/main" xmlns:r="http://schemas.openxmlformats.org/officeDocument/2006/relationships" xmlns:p="http://schemas.openxmlformats.org/presentationml/2006/main">
   <p:cSld>
+    <p:bg>
+      <p:bgPr>
+        <a:solidFill>
+          <a:schemeClr val="bg1"/>
+        </a:solidFill>
+        <a:effectLst/>
+      </p:bgPr>
+    </p:bg>
     <p:spTree>
       <p:nvGrpSpPr>
         <p:cNvPr id="1" name=""/>
@@ -20123,14 +20472,14 @@
       </p:grpSp>
       <p:sp>
         <p:nvSpPr>
-          <p:cNvPr id="6" name="TextBox 5"/>
+          <p:cNvPr id="15" name="TextBox 14"/>
           <p:cNvSpPr txBox="1"/>
           <p:nvPr/>
         </p:nvSpPr>
         <p:spPr>
           <a:xfrm>
-            <a:off x="10044953" y="3555640"/>
-            <a:ext cx="914400" cy="914400"/>
+            <a:off x="480855" y="4553024"/>
+            <a:ext cx="2118067" cy="1939852"/>
           </a:xfrm>
           <a:prstGeom prst="rect">
             <a:avLst/>
@@ -20138,18 +20487,30 @@
           <a:noFill/>
         </p:spPr>
         <p:txBody>
-          <a:bodyPr wrap="none" rtlCol="0">
+          <a:bodyPr wrap="square" rtlCol="0" anchor="ctr" anchorCtr="1">
             <a:noAutofit/>
           </a:bodyPr>
           <a:lstStyle/>
           <a:p>
-            <a:r>
-              <a:rPr lang="fr-FR" sz="3600" dirty="0">
+            <a:pPr algn="ctr"/>
+            <a:r>
+              <a:rPr lang="fr-FR" sz="2000" dirty="0">
                 <a:solidFill>
-                  <a:srgbClr val="B4009E"/>
+                  <a:srgbClr val="0078D7"/>
                 </a:solidFill>
               </a:rPr>
-              <a:t>FTW!</a:t>
+              <a:t>Bases de données relationnelles</a:t>
+            </a:r>
+          </a:p>
+          <a:p>
+            <a:pPr algn="ctr"/>
+            <a:r>
+              <a:rPr lang="fr-FR" sz="2000" dirty="0">
+                <a:solidFill>
+                  <a:srgbClr val="0078D7"/>
+                </a:solidFill>
+              </a:rPr>
+              <a:t>(ACID)</a:t>
             </a:r>
           </a:p>
         </p:txBody>
@@ -20258,6 +20619,89 @@
           </p:txBody>
         </p:sp>
       </p:grpSp>
+      <p:cxnSp>
+        <p:nvCxnSpPr>
+          <p:cNvPr id="7" name="Straight Connector 6"/>
+          <p:cNvCxnSpPr/>
+          <p:nvPr/>
+        </p:nvCxnSpPr>
+        <p:spPr>
+          <a:xfrm>
+            <a:off x="480855" y="4241346"/>
+            <a:ext cx="6099559" cy="21093"/>
+          </a:xfrm>
+          <a:prstGeom prst="line">
+            <a:avLst/>
+          </a:prstGeom>
+          <a:ln w="19050">
+            <a:solidFill>
+              <a:schemeClr val="bg1">
+                <a:lumMod val="85000"/>
+              </a:schemeClr>
+            </a:solidFill>
+            <a:prstDash val="lgDash"/>
+          </a:ln>
+        </p:spPr>
+        <p:style>
+          <a:lnRef idx="1">
+            <a:schemeClr val="accent1"/>
+          </a:lnRef>
+          <a:fillRef idx="0">
+            <a:schemeClr val="accent1"/>
+          </a:fillRef>
+          <a:effectRef idx="0">
+            <a:schemeClr val="accent1"/>
+          </a:effectRef>
+          <a:fontRef idx="minor">
+            <a:schemeClr val="tx1"/>
+          </a:fontRef>
+        </p:style>
+      </p:cxnSp>
+      <p:sp>
+        <p:nvSpPr>
+          <p:cNvPr id="6" name="TextBox 5"/>
+          <p:cNvSpPr txBox="1"/>
+          <p:nvPr/>
+        </p:nvSpPr>
+        <p:spPr>
+          <a:xfrm>
+            <a:off x="480855" y="1309564"/>
+            <a:ext cx="2118067" cy="1890835"/>
+          </a:xfrm>
+          <a:prstGeom prst="rect">
+            <a:avLst/>
+          </a:prstGeom>
+          <a:noFill/>
+        </p:spPr>
+        <p:txBody>
+          <a:bodyPr wrap="square" rtlCol="0" anchor="ctr" anchorCtr="1">
+            <a:noAutofit/>
+          </a:bodyPr>
+          <a:lstStyle/>
+          <a:p>
+            <a:pPr algn="ctr"/>
+            <a:r>
+              <a:rPr lang="fr-FR" sz="2000" dirty="0">
+                <a:solidFill>
+                  <a:srgbClr val="5C2C8F"/>
+                </a:solidFill>
+              </a:rPr>
+              <a:t>Caches, modèles dénormalisés, « prêts à «consommer »</a:t>
+            </a:r>
+          </a:p>
+          <a:p>
+            <a:pPr algn="ctr"/>
+            <a:r>
+              <a:rPr lang="fr-FR" sz="2000" dirty="0">
+                <a:solidFill>
+                  <a:srgbClr val="5C2C8F"/>
+                </a:solidFill>
+              </a:rPr>
+              <a:t>(no SQL)</a:t>
+            </a:r>
+          </a:p>
+        </p:txBody>
+      </p:sp>
     </p:spTree>
     <p:extLst>
       <p:ext uri="{BB962C8B-B14F-4D97-AF65-F5344CB8AC3E}">
@@ -20342,7 +20786,7 @@
             <a:pPr algn="ctr"/>
             <a:r>
               <a:rPr lang="fr-FR" sz="1800" dirty="0"/>
-              <a:t>Ne retourne pas de donnée !</a:t>
+              <a:t>&gt;&gt; Ne retourne pas de donnée ! &lt;&lt;</a:t>
             </a:r>
           </a:p>
           <a:p>
@@ -21173,7 +21617,7 @@
             <a:pPr algn="ctr"/>
             <a:r>
               <a:rPr lang="fr-FR" sz="4400" i="1" dirty="0"/>
-              <a:t>&lt;Slide pour </a:t>
+              <a:t>&lt;Slide(s) pour </a:t>
             </a:r>
             <a:r>
               <a:rPr lang="fr-FR" sz="4400" i="1" dirty="0" err="1"/>
@@ -21405,14 +21849,9 @@
           <a:lstStyle/>
           <a:p>
             <a:r>
-              <a:rPr lang="en-US" dirty="0"/>
-              <a:t>Pour </a:t>
-            </a:r>
-            <a:r>
-              <a:rPr lang="en-US" dirty="0" err="1"/>
-              <a:t>conclure</a:t>
-            </a:r>
-            <a:endParaRPr lang="en-US" dirty="0"/>
+              <a:rPr lang="fr-FR" dirty="0"/>
+              <a:t>Pour conclure…</a:t>
+            </a:r>
           </a:p>
         </p:txBody>
       </p:sp>
@@ -21591,13 +22030,13 @@
         </p:spPr>
         <p:txBody>
           <a:bodyPr anchor="ctr">
-            <a:normAutofit fontScale="85000" lnSpcReduction="20000"/>
+            <a:normAutofit/>
           </a:bodyPr>
           <a:lstStyle/>
           <a:p>
             <a:r>
-              <a:rPr lang="fr-FR" sz="4400" i="1" dirty="0"/>
-              <a:t>CQRS n’est pas un pattern général d’architecture</a:t>
+              <a:rPr lang="fr-FR" sz="4800" i="1" dirty="0"/>
+              <a:t>…un pattern général d’architecture</a:t>
             </a:r>
           </a:p>
           <a:p>
@@ -21605,17 +22044,17 @@
           </a:p>
           <a:p>
             <a:r>
-              <a:rPr lang="fr-FR" sz="4400" i="1" dirty="0"/>
+              <a:rPr lang="fr-FR" sz="2400" i="1" dirty="0"/>
               <a:t>Utilisez-le pour les composants soumis à rude épreuve (perf)</a:t>
             </a:r>
           </a:p>
           <a:p>
-            <a:endParaRPr lang="fr-FR" sz="4400" i="1" dirty="0"/>
-          </a:p>
-          <a:p>
-            <a:r>
-              <a:rPr lang="fr-FR" sz="4400" i="1" dirty="0"/>
-              <a:t>Ce pattern peut très bien être utilisé que sur une sous-partie de votre plate-forme</a:t>
+            <a:endParaRPr lang="fr-FR" sz="2400" i="1" dirty="0"/>
+          </a:p>
+          <a:p>
+            <a:r>
+              <a:rPr lang="fr-FR" sz="2400" i="1" dirty="0"/>
+              <a:t>Et uniquement sur une sous-partie de votre plate-forme par exemple</a:t>
             </a:r>
           </a:p>
         </p:txBody>
@@ -21636,8 +22075,12 @@
           <a:lstStyle/>
           <a:p>
             <a:r>
+              <a:rPr lang="en-US" dirty="0"/>
+              <a:t>CQRS </a:t>
+            </a:r>
+            <a:r>
               <a:rPr lang="en-US" dirty="0" err="1"/>
-              <a:t>N’en</a:t>
+              <a:t>ce</a:t>
             </a:r>
             <a:r>
               <a:rPr lang="en-US" dirty="0"/>
@@ -21645,19 +22088,11 @@
             </a:r>
             <a:r>
               <a:rPr lang="en-US" dirty="0" err="1"/>
-              <a:t>mettez</a:t>
+              <a:t>n’est</a:t>
             </a:r>
             <a:r>
               <a:rPr lang="en-US" dirty="0"/>
-              <a:t> pas </a:t>
-            </a:r>
-            <a:r>
-              <a:rPr lang="en-US" dirty="0" err="1"/>
-              <a:t>partout</a:t>
-            </a:r>
-            <a:r>
-              <a:rPr lang="en-US" dirty="0"/>
-              <a:t> !</a:t>
+              <a:t> pas…</a:t>
             </a:r>
           </a:p>
         </p:txBody>
@@ -21693,25 +22128,6 @@
             <a:endParaRPr lang="en-US" dirty="0">
               <a:latin typeface="Segoe" panose="020B0502040504020203"/>
             </a:endParaRPr>
-          </a:p>
-        </p:txBody>
-      </p:sp>
-      <p:sp>
-        <p:nvSpPr>
-          <p:cNvPr id="2" name="Text Placeholder 1"/>
-          <p:cNvSpPr>
-            <a:spLocks noGrp="1"/>
-          </p:cNvSpPr>
-          <p:nvPr>
-            <p:ph type="body" sz="quarter" idx="13"/>
-          </p:nvPr>
-        </p:nvSpPr>
-        <p:spPr/>
-        <p:txBody>
-          <a:bodyPr/>
-          <a:lstStyle/>
-          <a:p>
-            <a:endParaRPr lang="fr-FR"/>
           </a:p>
         </p:txBody>
       </p:sp>
@@ -21963,26 +22379,276 @@
         </p:nvSpPr>
         <p:spPr>
           <a:xfrm>
+            <a:off x="825843" y="2056534"/>
+            <a:ext cx="10515600" cy="3542755"/>
+          </a:xfrm>
+        </p:spPr>
+        <p:txBody>
+          <a:bodyPr anchor="ctr">
+            <a:normAutofit fontScale="92500" lnSpcReduction="20000"/>
+          </a:bodyPr>
+          <a:lstStyle/>
+          <a:p>
+            <a:pPr algn="ctr"/>
+            <a:r>
+              <a:rPr lang="fr-FR" sz="6000" i="1" dirty="0"/>
+              <a:t>               Event </a:t>
+            </a:r>
+            <a:r>
+              <a:rPr lang="fr-FR" sz="6000" i="1" dirty="0" err="1"/>
+              <a:t>Sourcing</a:t>
+            </a:r>
+            <a:endParaRPr lang="fr-FR" sz="6000" i="1" dirty="0"/>
+          </a:p>
+          <a:p>
+            <a:pPr algn="ctr"/>
+            <a:endParaRPr lang="fr-FR" sz="4000" i="1" dirty="0">
+              <a:solidFill>
+                <a:schemeClr val="bg1">
+                  <a:lumMod val="65000"/>
+                </a:schemeClr>
+              </a:solidFill>
+            </a:endParaRPr>
+          </a:p>
+          <a:p>
+            <a:pPr algn="ctr"/>
+            <a:endParaRPr lang="fr-FR" sz="4000" i="1" dirty="0">
+              <a:solidFill>
+                <a:schemeClr val="bg1">
+                  <a:lumMod val="65000"/>
+                </a:schemeClr>
+              </a:solidFill>
+            </a:endParaRPr>
+          </a:p>
+          <a:p>
+            <a:pPr algn="ctr"/>
+            <a:endParaRPr lang="fr-FR" sz="6000" i="1" dirty="0">
+              <a:solidFill>
+                <a:schemeClr val="bg1">
+                  <a:lumMod val="65000"/>
+                </a:schemeClr>
+              </a:solidFill>
+            </a:endParaRPr>
+          </a:p>
+          <a:p>
+            <a:pPr algn="ctr"/>
+            <a:r>
+              <a:rPr lang="fr-FR" sz="6000" i="1" dirty="0"/>
+              <a:t> </a:t>
+            </a:r>
+          </a:p>
+        </p:txBody>
+      </p:sp>
+      <p:sp>
+        <p:nvSpPr>
+          <p:cNvPr id="41" name="Title 40"/>
+          <p:cNvSpPr>
+            <a:spLocks noGrp="1"/>
+          </p:cNvSpPr>
+          <p:nvPr>
+            <p:ph type="title"/>
+          </p:nvPr>
+        </p:nvSpPr>
+        <p:spPr/>
+        <p:txBody>
+          <a:bodyPr/>
+          <a:lstStyle/>
+          <a:p>
+            <a:r>
+              <a:rPr lang="fr-FR" dirty="0"/>
+              <a:t>Ce n’est pas non plus…</a:t>
+            </a:r>
+          </a:p>
+        </p:txBody>
+      </p:sp>
+      <p:sp>
+        <p:nvSpPr>
+          <p:cNvPr id="29" name="Slide Number Placeholder 28"/>
+          <p:cNvSpPr>
+            <a:spLocks noGrp="1"/>
+          </p:cNvSpPr>
+          <p:nvPr>
+            <p:ph type="sldNum" sz="quarter" idx="4"/>
+          </p:nvPr>
+        </p:nvSpPr>
+        <p:spPr/>
+        <p:txBody>
+          <a:bodyPr/>
+          <a:lstStyle/>
+          <a:p>
+            <a:r>
+              <a:rPr lang="en-US" dirty="0">
+                <a:latin typeface="Segoe" panose="020B0502040504020203"/>
+              </a:rPr>
+              <a:t>N° </a:t>
+            </a:r>
+            <a:fld id="{6BFFD774-5C5F-4855-9115-A9F49D34CCD3}" type="slidenum">
+              <a:rPr lang="en-US" smtClean="0">
+                <a:latin typeface="Segoe" panose="020B0502040504020203"/>
+              </a:rPr>
+              <a:pPr/>
+              <a:t>40</a:t>
+            </a:fld>
+            <a:endParaRPr lang="en-US" dirty="0">
+              <a:latin typeface="Segoe" panose="020B0502040504020203"/>
+            </a:endParaRPr>
+          </a:p>
+        </p:txBody>
+      </p:sp>
+    </p:spTree>
+    <p:extLst>
+      <p:ext uri="{BB962C8B-B14F-4D97-AF65-F5344CB8AC3E}">
+        <p14:creationId xmlns:p14="http://schemas.microsoft.com/office/powerpoint/2010/main" val="1035014557"/>
+      </p:ext>
+    </p:extLst>
+  </p:cSld>
+  <p:clrMapOvr>
+    <a:masterClrMapping/>
+  </p:clrMapOvr>
+  <p:timing>
+    <p:tnLst>
+      <p:par>
+        <p:cTn id="1" dur="indefinite" restart="never" nodeType="tmRoot">
+          <p:childTnLst>
+            <p:seq concurrent="1" nextAc="seek">
+              <p:cTn id="2" dur="indefinite" nodeType="mainSeq">
+                <p:childTnLst>
+                  <p:par>
+                    <p:cTn id="3" fill="hold">
+                      <p:stCondLst>
+                        <p:cond delay="indefinite"/>
+                      </p:stCondLst>
+                      <p:childTnLst>
+                        <p:par>
+                          <p:cTn id="4" fill="hold">
+                            <p:stCondLst>
+                              <p:cond delay="0"/>
+                            </p:stCondLst>
+                            <p:childTnLst>
+                              <p:par>
+                                <p:cTn id="5" presetID="1" presetClass="entr" presetSubtype="0" fill="hold" grpId="0" nodeType="clickEffect">
+                                  <p:stCondLst>
+                                    <p:cond delay="0"/>
+                                  </p:stCondLst>
+                                  <p:childTnLst>
+                                    <p:set>
+                                      <p:cBhvr>
+                                        <p:cTn id="6" dur="1" fill="hold">
+                                          <p:stCondLst>
+                                            <p:cond delay="0"/>
+                                          </p:stCondLst>
+                                        </p:cTn>
+                                        <p:tgtEl>
+                                          <p:spTgt spid="38">
+                                            <p:txEl>
+                                              <p:pRg st="0" end="0"/>
+                                            </p:txEl>
+                                          </p:spTgt>
+                                        </p:tgtEl>
+                                        <p:attrNameLst>
+                                          <p:attrName>style.visibility</p:attrName>
+                                        </p:attrNameLst>
+                                      </p:cBhvr>
+                                      <p:to>
+                                        <p:strVal val="visible"/>
+                                      </p:to>
+                                    </p:set>
+                                  </p:childTnLst>
+                                </p:cTn>
+                              </p:par>
+                            </p:childTnLst>
+                          </p:cTn>
+                        </p:par>
+                      </p:childTnLst>
+                    </p:cTn>
+                  </p:par>
+                </p:childTnLst>
+              </p:cTn>
+              <p:prevCondLst>
+                <p:cond evt="onPrev" delay="0">
+                  <p:tgtEl>
+                    <p:sldTgt/>
+                  </p:tgtEl>
+                </p:cond>
+              </p:prevCondLst>
+              <p:nextCondLst>
+                <p:cond evt="onNext" delay="0">
+                  <p:tgtEl>
+                    <p:sldTgt/>
+                  </p:tgtEl>
+                </p:cond>
+              </p:nextCondLst>
+            </p:seq>
+          </p:childTnLst>
+        </p:cTn>
+      </p:par>
+    </p:tnLst>
+    <p:bldLst>
+      <p:bldP spid="38" grpId="0" uiExpand="1" build="p"/>
+    </p:bldLst>
+  </p:timing>
+</p:sld>
+</file>
+
+<file path=ppt/slides/slide41.xml><?xml version="1.0" encoding="utf-8"?>
+<p:sld xmlns:a="http://schemas.openxmlformats.org/drawingml/2006/main" xmlns:r="http://schemas.openxmlformats.org/officeDocument/2006/relationships" xmlns:p="http://schemas.openxmlformats.org/presentationml/2006/main">
+  <p:cSld>
+    <p:spTree>
+      <p:nvGrpSpPr>
+        <p:cNvPr id="1" name=""/>
+        <p:cNvGrpSpPr/>
+        <p:nvPr/>
+      </p:nvGrpSpPr>
+      <p:grpSpPr>
+        <a:xfrm>
+          <a:off x="0" y="0"/>
+          <a:ext cx="0" cy="0"/>
+          <a:chOff x="0" y="0"/>
+          <a:chExt cx="0" cy="0"/>
+        </a:xfrm>
+      </p:grpSpPr>
+      <p:sp>
+        <p:nvSpPr>
+          <p:cNvPr id="38" name="Content Placeholder 37"/>
+          <p:cNvSpPr>
+            <a:spLocks noGrp="1"/>
+          </p:cNvSpPr>
+          <p:nvPr>
+            <p:ph idx="1"/>
+          </p:nvPr>
+        </p:nvSpPr>
+        <p:spPr>
+          <a:xfrm>
             <a:off x="838200" y="2056534"/>
             <a:ext cx="10515600" cy="3542755"/>
           </a:xfrm>
         </p:spPr>
         <p:txBody>
           <a:bodyPr anchor="ctr">
-            <a:normAutofit/>
+            <a:normAutofit fontScale="92500" lnSpcReduction="20000"/>
           </a:bodyPr>
           <a:lstStyle/>
           <a:p>
             <a:pPr algn="ctr"/>
             <a:r>
               <a:rPr lang="fr-FR" sz="6000" i="1" dirty="0"/>
-              <a:t>CQRS          Event </a:t>
+              <a:t>CQRS      Event </a:t>
             </a:r>
             <a:r>
               <a:rPr lang="fr-FR" sz="6000" i="1" dirty="0" err="1"/>
               <a:t>Sourcing</a:t>
             </a:r>
             <a:endParaRPr lang="fr-FR" sz="6000" i="1" dirty="0"/>
+          </a:p>
+          <a:p>
+            <a:pPr algn="ctr"/>
+            <a:endParaRPr lang="fr-FR" sz="4000" i="1" dirty="0">
+              <a:solidFill>
+                <a:schemeClr val="bg1">
+                  <a:lumMod val="65000"/>
+                </a:schemeClr>
+              </a:solidFill>
+            </a:endParaRPr>
           </a:p>
           <a:p>
             <a:pPr algn="ctr"/>
@@ -21996,6 +22662,9 @@
               </a:rPr>
               <a:t>mais</a:t>
             </a:r>
+          </a:p>
+          <a:p>
+            <a:pPr algn="ctr"/>
             <a:endParaRPr lang="fr-FR" sz="6000" i="1" dirty="0">
               <a:solidFill>
                 <a:schemeClr val="bg1">
@@ -22035,7 +22704,7 @@
           <a:p>
             <a:r>
               <a:rPr lang="fr-FR" dirty="0"/>
-              <a:t>Une dernière précision</a:t>
+              <a:t>Ce n’est pas non plus…</a:t>
             </a:r>
           </a:p>
         </p:txBody>
@@ -22066,7 +22735,7 @@
                 <a:latin typeface="Segoe" panose="020B0502040504020203"/>
               </a:rPr>
               <a:pPr/>
-              <a:t>40</a:t>
+              <a:t>41</a:t>
             </a:fld>
             <a:endParaRPr lang="en-US" dirty="0">
               <a:latin typeface="Segoe" panose="020B0502040504020203"/>
@@ -22097,7 +22766,7 @@
         </p:blipFill>
         <p:spPr bwMode="auto">
           <a:xfrm>
-            <a:off x="4277435" y="2572562"/>
+            <a:off x="4393344" y="2056534"/>
             <a:ext cx="949657" cy="949657"/>
           </a:xfrm>
           <a:prstGeom prst="rect">
@@ -22115,79 +22784,473 @@
           </a:extLst>
         </p:spPr>
       </p:pic>
+      <p:sp>
+        <p:nvSpPr>
+          <p:cNvPr id="7" name="Content Placeholder 37"/>
+          <p:cNvSpPr txBox="1">
+            <a:spLocks/>
+          </p:cNvSpPr>
+          <p:nvPr/>
+        </p:nvSpPr>
+        <p:spPr>
+          <a:xfrm>
+            <a:off x="817604" y="2060650"/>
+            <a:ext cx="10515600" cy="3542755"/>
+          </a:xfrm>
+          <a:prstGeom prst="rect">
+            <a:avLst/>
+          </a:prstGeom>
+        </p:spPr>
+        <p:txBody>
+          <a:bodyPr vert="horz" lIns="91440" tIns="45720" rIns="91440" bIns="45720" rtlCol="0" anchor="ctr">
+            <a:normAutofit fontScale="92500" lnSpcReduction="20000"/>
+          </a:bodyPr>
+          <a:lstStyle>
+            <a:lvl1pPr marL="0" indent="0" algn="l" defTabSz="914400" rtl="0" eaLnBrk="1" latinLnBrk="0" hangingPunct="1">
+              <a:lnSpc>
+                <a:spcPct val="90000"/>
+              </a:lnSpc>
+              <a:spcBef>
+                <a:spcPts val="1000"/>
+              </a:spcBef>
+              <a:buFont typeface="Arial" panose="020B0604020202020204" pitchFamily="34" charset="0"/>
+              <a:buNone/>
+              <a:defRPr sz="2800" kern="1200">
+                <a:solidFill>
+                  <a:schemeClr val="tx1"/>
+                </a:solidFill>
+                <a:latin typeface="Segoe" panose="020B0502040504020203"/>
+                <a:ea typeface="+mn-ea"/>
+                <a:cs typeface="+mn-cs"/>
+              </a:defRPr>
+            </a:lvl1pPr>
+            <a:lvl2pPr marL="360363" indent="-360363" algn="l" defTabSz="914400" rtl="0" eaLnBrk="1" latinLnBrk="0" hangingPunct="1">
+              <a:lnSpc>
+                <a:spcPct val="90000"/>
+              </a:lnSpc>
+              <a:spcBef>
+                <a:spcPts val="500"/>
+              </a:spcBef>
+              <a:buFont typeface="Arial" panose="020B0604020202020204" pitchFamily="34" charset="0"/>
+              <a:buChar char="•"/>
+              <a:defRPr sz="2400" kern="1200">
+                <a:solidFill>
+                  <a:schemeClr val="tx1"/>
+                </a:solidFill>
+                <a:latin typeface="Segoe" panose="020B0502040504020203"/>
+                <a:ea typeface="+mn-ea"/>
+                <a:cs typeface="+mn-cs"/>
+              </a:defRPr>
+            </a:lvl2pPr>
+            <a:lvl3pPr marL="628650" indent="-254000" algn="l" defTabSz="914400" rtl="0" eaLnBrk="1" latinLnBrk="0" hangingPunct="1">
+              <a:lnSpc>
+                <a:spcPct val="90000"/>
+              </a:lnSpc>
+              <a:spcBef>
+                <a:spcPts val="500"/>
+              </a:spcBef>
+              <a:buFontTx/>
+              <a:buChar char="–"/>
+              <a:tabLst>
+                <a:tab pos="895350" algn="l"/>
+              </a:tabLst>
+              <a:defRPr sz="2400" kern="1200">
+                <a:solidFill>
+                  <a:schemeClr val="tx1"/>
+                </a:solidFill>
+                <a:latin typeface="Segoe" panose="020B0502040504020203"/>
+                <a:ea typeface="+mn-ea"/>
+                <a:cs typeface="+mn-cs"/>
+              </a:defRPr>
+            </a:lvl3pPr>
+            <a:lvl4pPr marL="895350" indent="476250" algn="l" defTabSz="914400" rtl="0" eaLnBrk="1" latinLnBrk="0" hangingPunct="1">
+              <a:lnSpc>
+                <a:spcPct val="90000"/>
+              </a:lnSpc>
+              <a:spcBef>
+                <a:spcPts val="500"/>
+              </a:spcBef>
+              <a:buFont typeface="Arial" panose="020B0604020202020204" pitchFamily="34" charset="0"/>
+              <a:buNone/>
+              <a:defRPr sz="2400" kern="1200">
+                <a:solidFill>
+                  <a:schemeClr val="tx1"/>
+                </a:solidFill>
+                <a:latin typeface="Segoe" panose="020B0502040504020203"/>
+                <a:ea typeface="+mn-ea"/>
+                <a:cs typeface="+mn-cs"/>
+              </a:defRPr>
+            </a:lvl4pPr>
+            <a:lvl5pPr marL="1828800" indent="0" algn="l" defTabSz="914400" rtl="0" eaLnBrk="1" latinLnBrk="0" hangingPunct="1">
+              <a:lnSpc>
+                <a:spcPct val="90000"/>
+              </a:lnSpc>
+              <a:spcBef>
+                <a:spcPts val="500"/>
+              </a:spcBef>
+              <a:buFont typeface="Arial" panose="020B0604020202020204" pitchFamily="34" charset="0"/>
+              <a:buNone/>
+              <a:defRPr sz="2400" kern="1200">
+                <a:solidFill>
+                  <a:schemeClr val="tx1"/>
+                </a:solidFill>
+                <a:latin typeface="Segoe" panose="020B0502040504020203"/>
+                <a:ea typeface="+mn-ea"/>
+                <a:cs typeface="+mn-cs"/>
+              </a:defRPr>
+            </a:lvl5pPr>
+            <a:lvl6pPr marL="2514600" indent="-228600" algn="l" defTabSz="914400" rtl="0" eaLnBrk="1" latinLnBrk="0" hangingPunct="1">
+              <a:lnSpc>
+                <a:spcPct val="90000"/>
+              </a:lnSpc>
+              <a:spcBef>
+                <a:spcPts val="500"/>
+              </a:spcBef>
+              <a:buFont typeface="Arial" panose="020B0604020202020204" pitchFamily="34" charset="0"/>
+              <a:buChar char="•"/>
+              <a:defRPr sz="1800" kern="1200">
+                <a:solidFill>
+                  <a:schemeClr val="tx1"/>
+                </a:solidFill>
+                <a:latin typeface="+mn-lt"/>
+                <a:ea typeface="+mn-ea"/>
+                <a:cs typeface="+mn-cs"/>
+              </a:defRPr>
+            </a:lvl6pPr>
+            <a:lvl7pPr marL="2971800" indent="-228600" algn="l" defTabSz="914400" rtl="0" eaLnBrk="1" latinLnBrk="0" hangingPunct="1">
+              <a:lnSpc>
+                <a:spcPct val="90000"/>
+              </a:lnSpc>
+              <a:spcBef>
+                <a:spcPts val="500"/>
+              </a:spcBef>
+              <a:buFont typeface="Arial" panose="020B0604020202020204" pitchFamily="34" charset="0"/>
+              <a:buChar char="•"/>
+              <a:defRPr sz="1800" kern="1200">
+                <a:solidFill>
+                  <a:schemeClr val="tx1"/>
+                </a:solidFill>
+                <a:latin typeface="+mn-lt"/>
+                <a:ea typeface="+mn-ea"/>
+                <a:cs typeface="+mn-cs"/>
+              </a:defRPr>
+            </a:lvl7pPr>
+            <a:lvl8pPr marL="3429000" indent="-228600" algn="l" defTabSz="914400" rtl="0" eaLnBrk="1" latinLnBrk="0" hangingPunct="1">
+              <a:lnSpc>
+                <a:spcPct val="90000"/>
+              </a:lnSpc>
+              <a:spcBef>
+                <a:spcPts val="500"/>
+              </a:spcBef>
+              <a:buFont typeface="Arial" panose="020B0604020202020204" pitchFamily="34" charset="0"/>
+              <a:buChar char="•"/>
+              <a:defRPr sz="1800" kern="1200">
+                <a:solidFill>
+                  <a:schemeClr val="tx1"/>
+                </a:solidFill>
+                <a:latin typeface="+mn-lt"/>
+                <a:ea typeface="+mn-ea"/>
+                <a:cs typeface="+mn-cs"/>
+              </a:defRPr>
+            </a:lvl8pPr>
+            <a:lvl9pPr marL="3886200" indent="-228600" algn="l" defTabSz="914400" rtl="0" eaLnBrk="1" latinLnBrk="0" hangingPunct="1">
+              <a:lnSpc>
+                <a:spcPct val="90000"/>
+              </a:lnSpc>
+              <a:spcBef>
+                <a:spcPts val="500"/>
+              </a:spcBef>
+              <a:buFont typeface="Arial" panose="020B0604020202020204" pitchFamily="34" charset="0"/>
+              <a:buChar char="•"/>
+              <a:defRPr sz="1800" kern="1200">
+                <a:solidFill>
+                  <a:schemeClr val="tx1"/>
+                </a:solidFill>
+                <a:latin typeface="+mn-lt"/>
+                <a:ea typeface="+mn-ea"/>
+                <a:cs typeface="+mn-cs"/>
+              </a:defRPr>
+            </a:lvl9pPr>
+          </a:lstStyle>
+          <a:p>
+            <a:pPr algn="ctr"/>
+            <a:r>
+              <a:rPr lang="fr-FR" sz="6000" i="1" dirty="0"/>
+              <a:t>               Event </a:t>
+            </a:r>
+            <a:r>
+              <a:rPr lang="fr-FR" sz="6000" i="1" dirty="0" err="1"/>
+              <a:t>Sourcing</a:t>
+            </a:r>
+            <a:endParaRPr lang="fr-FR" sz="6000" i="1" dirty="0"/>
+          </a:p>
+          <a:p>
+            <a:pPr algn="ctr"/>
+            <a:endParaRPr lang="fr-FR" sz="4000" i="1" dirty="0">
+              <a:solidFill>
+                <a:schemeClr val="bg1">
+                  <a:lumMod val="65000"/>
+                </a:schemeClr>
+              </a:solidFill>
+            </a:endParaRPr>
+          </a:p>
+          <a:p>
+            <a:pPr algn="ctr"/>
+            <a:endParaRPr lang="fr-FR" sz="4000" i="1" dirty="0">
+              <a:solidFill>
+                <a:schemeClr val="bg1">
+                  <a:lumMod val="65000"/>
+                </a:schemeClr>
+              </a:solidFill>
+            </a:endParaRPr>
+          </a:p>
+          <a:p>
+            <a:pPr algn="ctr"/>
+            <a:endParaRPr lang="fr-FR" sz="6000" i="1" dirty="0">
+              <a:solidFill>
+                <a:schemeClr val="bg1">
+                  <a:lumMod val="65000"/>
+                </a:schemeClr>
+              </a:solidFill>
+            </a:endParaRPr>
+          </a:p>
+          <a:p>
+            <a:pPr algn="ctr"/>
+            <a:r>
+              <a:rPr lang="fr-FR" sz="6000" i="1" dirty="0"/>
+              <a:t> </a:t>
+            </a:r>
+          </a:p>
+        </p:txBody>
+      </p:sp>
     </p:spTree>
     <p:extLst>
       <p:ext uri="{BB962C8B-B14F-4D97-AF65-F5344CB8AC3E}">
-        <p14:creationId xmlns:p14="http://schemas.microsoft.com/office/powerpoint/2010/main" val="1035014557"/>
+        <p14:creationId xmlns:p14="http://schemas.microsoft.com/office/powerpoint/2010/main" val="2092131959"/>
       </p:ext>
     </p:extLst>
   </p:cSld>
   <p:clrMapOvr>
     <a:masterClrMapping/>
   </p:clrMapOvr>
-</p:sld>
-</file>
-
-<file path=ppt/slides/slide41.xml><?xml version="1.0" encoding="utf-8"?>
-<p:sld xmlns:a="http://schemas.openxmlformats.org/drawingml/2006/main" xmlns:r="http://schemas.openxmlformats.org/officeDocument/2006/relationships" xmlns:p="http://schemas.openxmlformats.org/presentationml/2006/main">
-  <p:cSld>
-    <p:spTree>
-      <p:nvGrpSpPr>
-        <p:cNvPr id="1" name=""/>
-        <p:cNvGrpSpPr/>
-        <p:nvPr/>
-      </p:nvGrpSpPr>
-      <p:grpSpPr>
-        <a:xfrm>
-          <a:off x="0" y="0"/>
-          <a:ext cx="0" cy="0"/>
-          <a:chOff x="0" y="0"/>
-          <a:chExt cx="0" cy="0"/>
-        </a:xfrm>
-      </p:grpSpPr>
-      <p:sp>
-        <p:nvSpPr>
-          <p:cNvPr id="3" name="Slide Number Placeholder 2"/>
-          <p:cNvSpPr>
-            <a:spLocks noGrp="1"/>
-          </p:cNvSpPr>
-          <p:nvPr>
-            <p:ph type="sldNum" sz="quarter" idx="4294967295"/>
-          </p:nvPr>
-        </p:nvSpPr>
-        <p:spPr>
-          <a:xfrm>
-            <a:off x="9448800" y="6492875"/>
-            <a:ext cx="2743200" cy="365125"/>
-          </a:xfrm>
-        </p:spPr>
-        <p:txBody>
-          <a:bodyPr/>
-          <a:lstStyle/>
-          <a:p>
-            <a:r>
-              <a:rPr lang="en-US"/>
-              <a:t>N° </a:t>
-            </a:r>
-            <a:fld id="{6BFFD774-5C5F-4855-9115-A9F49D34CCD3}" type="slidenum">
-              <a:rPr lang="en-US" smtClean="0"/>
-              <a:pPr/>
-              <a:t>41</a:t>
-            </a:fld>
-            <a:endParaRPr lang="en-US" dirty="0"/>
-          </a:p>
-        </p:txBody>
-      </p:sp>
-    </p:spTree>
-    <p:extLst>
-      <p:ext uri="{BB962C8B-B14F-4D97-AF65-F5344CB8AC3E}">
-        <p14:creationId xmlns:p14="http://schemas.microsoft.com/office/powerpoint/2010/main" val="3406228000"/>
-      </p:ext>
-    </p:extLst>
-  </p:cSld>
-  <p:clrMapOvr>
-    <a:masterClrMapping/>
-  </p:clrMapOvr>
+  <p:timing>
+    <p:tnLst>
+      <p:par>
+        <p:cTn id="1" dur="indefinite" restart="never" nodeType="tmRoot">
+          <p:childTnLst>
+            <p:seq concurrent="1" nextAc="seek">
+              <p:cTn id="2" dur="indefinite" nodeType="mainSeq">
+                <p:childTnLst>
+                  <p:par>
+                    <p:cTn id="3" fill="hold">
+                      <p:stCondLst>
+                        <p:cond delay="indefinite"/>
+                        <p:cond evt="onBegin" delay="0">
+                          <p:tn val="2"/>
+                        </p:cond>
+                      </p:stCondLst>
+                      <p:childTnLst>
+                        <p:par>
+                          <p:cTn id="4" fill="hold">
+                            <p:stCondLst>
+                              <p:cond delay="0"/>
+                            </p:stCondLst>
+                            <p:childTnLst>
+                              <p:par>
+                                <p:cTn id="5" presetID="10" presetClass="entr" presetSubtype="0" fill="hold" grpId="0" nodeType="withEffect">
+                                  <p:stCondLst>
+                                    <p:cond delay="0"/>
+                                  </p:stCondLst>
+                                  <p:childTnLst>
+                                    <p:set>
+                                      <p:cBhvr>
+                                        <p:cTn id="6" dur="1" fill="hold">
+                                          <p:stCondLst>
+                                            <p:cond delay="0"/>
+                                          </p:stCondLst>
+                                        </p:cTn>
+                                        <p:tgtEl>
+                                          <p:spTgt spid="38">
+                                            <p:txEl>
+                                              <p:pRg st="0" end="0"/>
+                                            </p:txEl>
+                                          </p:spTgt>
+                                        </p:tgtEl>
+                                        <p:attrNameLst>
+                                          <p:attrName>style.visibility</p:attrName>
+                                        </p:attrNameLst>
+                                      </p:cBhvr>
+                                      <p:to>
+                                        <p:strVal val="visible"/>
+                                      </p:to>
+                                    </p:set>
+                                    <p:animEffect transition="in" filter="fade">
+                                      <p:cBhvr>
+                                        <p:cTn id="7" dur="2000"/>
+                                        <p:tgtEl>
+                                          <p:spTgt spid="38">
+                                            <p:txEl>
+                                              <p:pRg st="0" end="0"/>
+                                            </p:txEl>
+                                          </p:spTgt>
+                                        </p:tgtEl>
+                                      </p:cBhvr>
+                                    </p:animEffect>
+                                  </p:childTnLst>
+                                </p:cTn>
+                              </p:par>
+                              <p:par>
+                                <p:cTn id="8" presetID="10" presetClass="entr" presetSubtype="0" fill="hold" nodeType="withEffect">
+                                  <p:stCondLst>
+                                    <p:cond delay="0"/>
+                                  </p:stCondLst>
+                                  <p:childTnLst>
+                                    <p:set>
+                                      <p:cBhvr>
+                                        <p:cTn id="9" dur="1" fill="hold">
+                                          <p:stCondLst>
+                                            <p:cond delay="0"/>
+                                          </p:stCondLst>
+                                        </p:cTn>
+                                        <p:tgtEl>
+                                          <p:spTgt spid="14338"/>
+                                        </p:tgtEl>
+                                        <p:attrNameLst>
+                                          <p:attrName>style.visibility</p:attrName>
+                                        </p:attrNameLst>
+                                      </p:cBhvr>
+                                      <p:to>
+                                        <p:strVal val="visible"/>
+                                      </p:to>
+                                    </p:set>
+                                    <p:animEffect transition="in" filter="fade">
+                                      <p:cBhvr>
+                                        <p:cTn id="10" dur="2000"/>
+                                        <p:tgtEl>
+                                          <p:spTgt spid="14338"/>
+                                        </p:tgtEl>
+                                      </p:cBhvr>
+                                    </p:animEffect>
+                                  </p:childTnLst>
+                                </p:cTn>
+                              </p:par>
+                              <p:par>
+                                <p:cTn id="11" presetID="10" presetClass="entr" presetSubtype="0" fill="hold" grpId="0" nodeType="withEffect">
+                                  <p:stCondLst>
+                                    <p:cond delay="0"/>
+                                  </p:stCondLst>
+                                  <p:childTnLst>
+                                    <p:set>
+                                      <p:cBhvr>
+                                        <p:cTn id="12" dur="1" fill="hold">
+                                          <p:stCondLst>
+                                            <p:cond delay="0"/>
+                                          </p:stCondLst>
+                                        </p:cTn>
+                                        <p:tgtEl>
+                                          <p:spTgt spid="38">
+                                            <p:txEl>
+                                              <p:pRg st="2" end="2"/>
+                                            </p:txEl>
+                                          </p:spTgt>
+                                        </p:tgtEl>
+                                        <p:attrNameLst>
+                                          <p:attrName>style.visibility</p:attrName>
+                                        </p:attrNameLst>
+                                      </p:cBhvr>
+                                      <p:to>
+                                        <p:strVal val="visible"/>
+                                      </p:to>
+                                    </p:set>
+                                    <p:animEffect transition="in" filter="fade">
+                                      <p:cBhvr>
+                                        <p:cTn id="13" dur="2000"/>
+                                        <p:tgtEl>
+                                          <p:spTgt spid="38">
+                                            <p:txEl>
+                                              <p:pRg st="2" end="2"/>
+                                            </p:txEl>
+                                          </p:spTgt>
+                                        </p:tgtEl>
+                                      </p:cBhvr>
+                                    </p:animEffect>
+                                  </p:childTnLst>
+                                </p:cTn>
+                              </p:par>
+                              <p:par>
+                                <p:cTn id="14" presetID="10" presetClass="entr" presetSubtype="0" fill="hold" grpId="0" nodeType="withEffect">
+                                  <p:stCondLst>
+                                    <p:cond delay="0"/>
+                                  </p:stCondLst>
+                                  <p:childTnLst>
+                                    <p:set>
+                                      <p:cBhvr>
+                                        <p:cTn id="15" dur="1" fill="hold">
+                                          <p:stCondLst>
+                                            <p:cond delay="0"/>
+                                          </p:stCondLst>
+                                        </p:cTn>
+                                        <p:tgtEl>
+                                          <p:spTgt spid="38">
+                                            <p:txEl>
+                                              <p:pRg st="4" end="4"/>
+                                            </p:txEl>
+                                          </p:spTgt>
+                                        </p:tgtEl>
+                                        <p:attrNameLst>
+                                          <p:attrName>style.visibility</p:attrName>
+                                        </p:attrNameLst>
+                                      </p:cBhvr>
+                                      <p:to>
+                                        <p:strVal val="visible"/>
+                                      </p:to>
+                                    </p:set>
+                                    <p:animEffect transition="in" filter="fade">
+                                      <p:cBhvr>
+                                        <p:cTn id="16" dur="2000"/>
+                                        <p:tgtEl>
+                                          <p:spTgt spid="38">
+                                            <p:txEl>
+                                              <p:pRg st="4" end="4"/>
+                                            </p:txEl>
+                                          </p:spTgt>
+                                        </p:tgtEl>
+                                      </p:cBhvr>
+                                    </p:animEffect>
+                                  </p:childTnLst>
+                                </p:cTn>
+                              </p:par>
+                            </p:childTnLst>
+                          </p:cTn>
+                        </p:par>
+                      </p:childTnLst>
+                    </p:cTn>
+                  </p:par>
+                </p:childTnLst>
+              </p:cTn>
+              <p:prevCondLst>
+                <p:cond evt="onPrev" delay="0">
+                  <p:tgtEl>
+                    <p:sldTgt/>
+                  </p:tgtEl>
+                </p:cond>
+              </p:prevCondLst>
+              <p:nextCondLst>
+                <p:cond evt="onNext" delay="0">
+                  <p:tgtEl>
+                    <p:sldTgt/>
+                  </p:tgtEl>
+                </p:cond>
+              </p:nextCondLst>
+            </p:seq>
+          </p:childTnLst>
+        </p:cTn>
+      </p:par>
+    </p:tnLst>
+    <p:bldLst>
+      <p:bldP spid="38" grpId="0" uiExpand="1" build="allAtOnce"/>
+    </p:bldLst>
+  </p:timing>
 </p:sld>
 </file>
 
@@ -22210,6 +23273,1613 @@
       </p:grpSpPr>
       <p:sp>
         <p:nvSpPr>
+          <p:cNvPr id="38" name="Content Placeholder 37"/>
+          <p:cNvSpPr>
+            <a:spLocks noGrp="1"/>
+          </p:cNvSpPr>
+          <p:nvPr>
+            <p:ph idx="1"/>
+          </p:nvPr>
+        </p:nvSpPr>
+        <p:spPr>
+          <a:xfrm>
+            <a:off x="838200" y="2056534"/>
+            <a:ext cx="10515600" cy="3120773"/>
+          </a:xfrm>
+        </p:spPr>
+        <p:txBody>
+          <a:bodyPr anchor="ctr">
+            <a:normAutofit/>
+          </a:bodyPr>
+          <a:lstStyle/>
+          <a:p>
+            <a:pPr algn="ctr"/>
+            <a:r>
+              <a:rPr lang="en-US" sz="4400" dirty="0" err="1"/>
+              <a:t>Donc</a:t>
+            </a:r>
+            <a:r>
+              <a:rPr lang="en-US" sz="4400" dirty="0"/>
+              <a:t> </a:t>
+            </a:r>
+            <a:r>
+              <a:rPr lang="en-US" sz="4400" dirty="0" err="1"/>
+              <a:t>vous</a:t>
+            </a:r>
+            <a:r>
+              <a:rPr lang="en-US" sz="4400" dirty="0"/>
+              <a:t> </a:t>
+            </a:r>
+            <a:r>
+              <a:rPr lang="en-US" sz="4400" dirty="0" err="1"/>
+              <a:t>l’aurez</a:t>
+            </a:r>
+            <a:r>
+              <a:rPr lang="en-US" sz="4400" dirty="0"/>
+              <a:t> </a:t>
+            </a:r>
+            <a:r>
+              <a:rPr lang="en-US" sz="4400" dirty="0" err="1"/>
+              <a:t>compris</a:t>
+            </a:r>
+            <a:r>
+              <a:rPr lang="en-US" sz="4400" dirty="0"/>
+              <a:t>…</a:t>
+            </a:r>
+            <a:endParaRPr lang="fr-FR" sz="4400" i="1" dirty="0"/>
+          </a:p>
+        </p:txBody>
+      </p:sp>
+      <p:sp>
+        <p:nvSpPr>
+          <p:cNvPr id="29" name="Slide Number Placeholder 28"/>
+          <p:cNvSpPr>
+            <a:spLocks noGrp="1"/>
+          </p:cNvSpPr>
+          <p:nvPr>
+            <p:ph type="sldNum" sz="quarter" idx="4"/>
+          </p:nvPr>
+        </p:nvSpPr>
+        <p:spPr/>
+        <p:txBody>
+          <a:bodyPr/>
+          <a:lstStyle/>
+          <a:p>
+            <a:r>
+              <a:rPr lang="en-US" dirty="0">
+                <a:latin typeface="Segoe" panose="020B0502040504020203"/>
+              </a:rPr>
+              <a:t>N° </a:t>
+            </a:r>
+            <a:fld id="{6BFFD774-5C5F-4855-9115-A9F49D34CCD3}" type="slidenum">
+              <a:rPr lang="en-US" smtClean="0">
+                <a:latin typeface="Segoe" panose="020B0502040504020203"/>
+              </a:rPr>
+              <a:pPr/>
+              <a:t>42</a:t>
+            </a:fld>
+            <a:endParaRPr lang="en-US" dirty="0">
+              <a:latin typeface="Segoe" panose="020B0502040504020203"/>
+            </a:endParaRPr>
+          </a:p>
+        </p:txBody>
+      </p:sp>
+    </p:spTree>
+    <p:extLst>
+      <p:ext uri="{BB962C8B-B14F-4D97-AF65-F5344CB8AC3E}">
+        <p14:creationId xmlns:p14="http://schemas.microsoft.com/office/powerpoint/2010/main" val="4102372552"/>
+      </p:ext>
+    </p:extLst>
+  </p:cSld>
+  <p:clrMapOvr>
+    <a:masterClrMapping/>
+  </p:clrMapOvr>
+</p:sld>
+</file>
+
+<file path=ppt/slides/slide43.xml><?xml version="1.0" encoding="utf-8"?>
+<p:sld xmlns:a="http://schemas.openxmlformats.org/drawingml/2006/main" xmlns:r="http://schemas.openxmlformats.org/officeDocument/2006/relationships" xmlns:p="http://schemas.openxmlformats.org/presentationml/2006/main">
+  <p:cSld>
+    <p:spTree>
+      <p:nvGrpSpPr>
+        <p:cNvPr id="1" name=""/>
+        <p:cNvGrpSpPr/>
+        <p:nvPr/>
+      </p:nvGrpSpPr>
+      <p:grpSpPr>
+        <a:xfrm>
+          <a:off x="0" y="0"/>
+          <a:ext cx="0" cy="0"/>
+          <a:chOff x="0" y="0"/>
+          <a:chExt cx="0" cy="0"/>
+        </a:xfrm>
+      </p:grpSpPr>
+      <p:sp>
+        <p:nvSpPr>
+          <p:cNvPr id="38" name="Content Placeholder 37"/>
+          <p:cNvSpPr>
+            <a:spLocks noGrp="1"/>
+          </p:cNvSpPr>
+          <p:nvPr>
+            <p:ph idx="1"/>
+          </p:nvPr>
+        </p:nvSpPr>
+        <p:spPr>
+          <a:xfrm>
+            <a:off x="635000" y="1175849"/>
+            <a:ext cx="10515600" cy="776977"/>
+          </a:xfrm>
+        </p:spPr>
+        <p:txBody>
+          <a:bodyPr anchor="ctr">
+            <a:normAutofit fontScale="70000" lnSpcReduction="20000"/>
+          </a:bodyPr>
+          <a:lstStyle/>
+          <a:p>
+            <a:r>
+              <a:rPr lang="fr-FR" sz="4400" i="1" dirty="0"/>
+              <a:t>… bien séparer son code de lecture et son code d’écriture</a:t>
+            </a:r>
+          </a:p>
+        </p:txBody>
+      </p:sp>
+      <p:sp>
+        <p:nvSpPr>
+          <p:cNvPr id="41" name="Title 40"/>
+          <p:cNvSpPr>
+            <a:spLocks noGrp="1"/>
+          </p:cNvSpPr>
+          <p:nvPr>
+            <p:ph type="title"/>
+          </p:nvPr>
+        </p:nvSpPr>
+        <p:spPr/>
+        <p:txBody>
+          <a:bodyPr/>
+          <a:lstStyle/>
+          <a:p>
+            <a:r>
+              <a:rPr lang="fr-FR" dirty="0"/>
+              <a:t>CQRS c’est surtout…</a:t>
+            </a:r>
+          </a:p>
+        </p:txBody>
+      </p:sp>
+      <p:sp>
+        <p:nvSpPr>
+          <p:cNvPr id="29" name="Slide Number Placeholder 28"/>
+          <p:cNvSpPr>
+            <a:spLocks noGrp="1"/>
+          </p:cNvSpPr>
+          <p:nvPr>
+            <p:ph type="sldNum" sz="quarter" idx="4"/>
+          </p:nvPr>
+        </p:nvSpPr>
+        <p:spPr/>
+        <p:txBody>
+          <a:bodyPr/>
+          <a:lstStyle/>
+          <a:p>
+            <a:r>
+              <a:rPr lang="en-US" dirty="0">
+                <a:latin typeface="Segoe" panose="020B0502040504020203"/>
+              </a:rPr>
+              <a:t>N° </a:t>
+            </a:r>
+            <a:fld id="{6BFFD774-5C5F-4855-9115-A9F49D34CCD3}" type="slidenum">
+              <a:rPr lang="en-US" smtClean="0">
+                <a:latin typeface="Segoe" panose="020B0502040504020203"/>
+              </a:rPr>
+              <a:pPr/>
+              <a:t>43</a:t>
+            </a:fld>
+            <a:endParaRPr lang="en-US" dirty="0">
+              <a:latin typeface="Segoe" panose="020B0502040504020203"/>
+            </a:endParaRPr>
+          </a:p>
+        </p:txBody>
+      </p:sp>
+      <p:cxnSp>
+        <p:nvCxnSpPr>
+          <p:cNvPr id="3" name="Straight Connector 2"/>
+          <p:cNvCxnSpPr/>
+          <p:nvPr/>
+        </p:nvCxnSpPr>
+        <p:spPr>
+          <a:xfrm>
+            <a:off x="5892800" y="2190044"/>
+            <a:ext cx="0" cy="4064000"/>
+          </a:xfrm>
+          <a:prstGeom prst="line">
+            <a:avLst/>
+          </a:prstGeom>
+          <a:ln w="79375">
+            <a:solidFill>
+              <a:schemeClr val="bg1">
+                <a:lumMod val="75000"/>
+              </a:schemeClr>
+            </a:solidFill>
+            <a:prstDash val="lgDash"/>
+          </a:ln>
+        </p:spPr>
+        <p:style>
+          <a:lnRef idx="1">
+            <a:schemeClr val="accent1"/>
+          </a:lnRef>
+          <a:fillRef idx="0">
+            <a:schemeClr val="accent1"/>
+          </a:fillRef>
+          <a:effectRef idx="0">
+            <a:schemeClr val="accent1"/>
+          </a:effectRef>
+          <a:fontRef idx="minor">
+            <a:schemeClr val="tx1"/>
+          </a:fontRef>
+        </p:style>
+      </p:cxnSp>
+      <p:grpSp>
+        <p:nvGrpSpPr>
+          <p:cNvPr id="4" name="Group 3"/>
+          <p:cNvGrpSpPr/>
+          <p:nvPr/>
+        </p:nvGrpSpPr>
+        <p:grpSpPr>
+          <a:xfrm>
+            <a:off x="6640820" y="2699662"/>
+            <a:ext cx="4772696" cy="3276593"/>
+            <a:chOff x="6625768" y="4456923"/>
+            <a:chExt cx="4772696" cy="2664537"/>
+          </a:xfrm>
+        </p:grpSpPr>
+        <p:grpSp>
+          <p:nvGrpSpPr>
+            <p:cNvPr id="12" name="Group 11"/>
+            <p:cNvGrpSpPr/>
+            <p:nvPr/>
+          </p:nvGrpSpPr>
+          <p:grpSpPr>
+            <a:xfrm>
+              <a:off x="6774139" y="4456923"/>
+              <a:ext cx="4216363" cy="1435871"/>
+              <a:chOff x="3504650" y="1511335"/>
+              <a:chExt cx="8005110" cy="2726118"/>
+            </a:xfrm>
+          </p:grpSpPr>
+          <p:sp>
+            <p:nvSpPr>
+              <p:cNvPr id="13" name="Content Placeholder 37"/>
+              <p:cNvSpPr txBox="1">
+                <a:spLocks/>
+              </p:cNvSpPr>
+              <p:nvPr/>
+            </p:nvSpPr>
+            <p:spPr>
+              <a:xfrm>
+                <a:off x="3504650" y="2102181"/>
+                <a:ext cx="3618087" cy="1886867"/>
+              </a:xfrm>
+              <a:prstGeom prst="rect">
+                <a:avLst/>
+              </a:prstGeom>
+            </p:spPr>
+            <p:txBody>
+              <a:bodyPr vert="horz" lIns="91440" tIns="45720" rIns="91440" bIns="45720" rtlCol="0" anchor="ctr">
+                <a:normAutofit/>
+              </a:bodyPr>
+              <a:lstStyle>
+                <a:lvl1pPr marL="0" indent="0" algn="l" defTabSz="914400" rtl="0" eaLnBrk="1" latinLnBrk="0" hangingPunct="1">
+                  <a:lnSpc>
+                    <a:spcPct val="90000"/>
+                  </a:lnSpc>
+                  <a:spcBef>
+                    <a:spcPts val="1000"/>
+                  </a:spcBef>
+                  <a:buFont typeface="Arial" panose="020B0604020202020204" pitchFamily="34" charset="0"/>
+                  <a:buNone/>
+                  <a:defRPr sz="2800" kern="1200">
+                    <a:solidFill>
+                      <a:schemeClr val="tx1"/>
+                    </a:solidFill>
+                    <a:latin typeface="Segoe" panose="020B0502040504020203"/>
+                    <a:ea typeface="+mn-ea"/>
+                    <a:cs typeface="+mn-cs"/>
+                  </a:defRPr>
+                </a:lvl1pPr>
+                <a:lvl2pPr marL="360363" indent="-360363" algn="l" defTabSz="914400" rtl="0" eaLnBrk="1" latinLnBrk="0" hangingPunct="1">
+                  <a:lnSpc>
+                    <a:spcPct val="90000"/>
+                  </a:lnSpc>
+                  <a:spcBef>
+                    <a:spcPts val="500"/>
+                  </a:spcBef>
+                  <a:buFont typeface="Arial" panose="020B0604020202020204" pitchFamily="34" charset="0"/>
+                  <a:buChar char="•"/>
+                  <a:defRPr sz="2400" kern="1200">
+                    <a:solidFill>
+                      <a:schemeClr val="tx1"/>
+                    </a:solidFill>
+                    <a:latin typeface="Segoe" panose="020B0502040504020203"/>
+                    <a:ea typeface="+mn-ea"/>
+                    <a:cs typeface="+mn-cs"/>
+                  </a:defRPr>
+                </a:lvl2pPr>
+                <a:lvl3pPr marL="628650" indent="-254000" algn="l" defTabSz="914400" rtl="0" eaLnBrk="1" latinLnBrk="0" hangingPunct="1">
+                  <a:lnSpc>
+                    <a:spcPct val="90000"/>
+                  </a:lnSpc>
+                  <a:spcBef>
+                    <a:spcPts val="500"/>
+                  </a:spcBef>
+                  <a:buFontTx/>
+                  <a:buChar char="–"/>
+                  <a:tabLst>
+                    <a:tab pos="895350" algn="l"/>
+                  </a:tabLst>
+                  <a:defRPr sz="2400" kern="1200">
+                    <a:solidFill>
+                      <a:schemeClr val="tx1"/>
+                    </a:solidFill>
+                    <a:latin typeface="Segoe" panose="020B0502040504020203"/>
+                    <a:ea typeface="+mn-ea"/>
+                    <a:cs typeface="+mn-cs"/>
+                  </a:defRPr>
+                </a:lvl3pPr>
+                <a:lvl4pPr marL="895350" indent="476250" algn="l" defTabSz="914400" rtl="0" eaLnBrk="1" latinLnBrk="0" hangingPunct="1">
+                  <a:lnSpc>
+                    <a:spcPct val="90000"/>
+                  </a:lnSpc>
+                  <a:spcBef>
+                    <a:spcPts val="500"/>
+                  </a:spcBef>
+                  <a:buFont typeface="Arial" panose="020B0604020202020204" pitchFamily="34" charset="0"/>
+                  <a:buNone/>
+                  <a:defRPr sz="2400" kern="1200">
+                    <a:solidFill>
+                      <a:schemeClr val="tx1"/>
+                    </a:solidFill>
+                    <a:latin typeface="Segoe" panose="020B0502040504020203"/>
+                    <a:ea typeface="+mn-ea"/>
+                    <a:cs typeface="+mn-cs"/>
+                  </a:defRPr>
+                </a:lvl4pPr>
+                <a:lvl5pPr marL="1828800" indent="0" algn="l" defTabSz="914400" rtl="0" eaLnBrk="1" latinLnBrk="0" hangingPunct="1">
+                  <a:lnSpc>
+                    <a:spcPct val="90000"/>
+                  </a:lnSpc>
+                  <a:spcBef>
+                    <a:spcPts val="500"/>
+                  </a:spcBef>
+                  <a:buFont typeface="Arial" panose="020B0604020202020204" pitchFamily="34" charset="0"/>
+                  <a:buNone/>
+                  <a:defRPr sz="2400" kern="1200">
+                    <a:solidFill>
+                      <a:schemeClr val="tx1"/>
+                    </a:solidFill>
+                    <a:latin typeface="Segoe" panose="020B0502040504020203"/>
+                    <a:ea typeface="+mn-ea"/>
+                    <a:cs typeface="+mn-cs"/>
+                  </a:defRPr>
+                </a:lvl5pPr>
+                <a:lvl6pPr marL="2514600" indent="-228600" algn="l" defTabSz="914400" rtl="0" eaLnBrk="1" latinLnBrk="0" hangingPunct="1">
+                  <a:lnSpc>
+                    <a:spcPct val="90000"/>
+                  </a:lnSpc>
+                  <a:spcBef>
+                    <a:spcPts val="500"/>
+                  </a:spcBef>
+                  <a:buFont typeface="Arial" panose="020B0604020202020204" pitchFamily="34" charset="0"/>
+                  <a:buChar char="•"/>
+                  <a:defRPr sz="1800" kern="1200">
+                    <a:solidFill>
+                      <a:schemeClr val="tx1"/>
+                    </a:solidFill>
+                    <a:latin typeface="+mn-lt"/>
+                    <a:ea typeface="+mn-ea"/>
+                    <a:cs typeface="+mn-cs"/>
+                  </a:defRPr>
+                </a:lvl6pPr>
+                <a:lvl7pPr marL="2971800" indent="-228600" algn="l" defTabSz="914400" rtl="0" eaLnBrk="1" latinLnBrk="0" hangingPunct="1">
+                  <a:lnSpc>
+                    <a:spcPct val="90000"/>
+                  </a:lnSpc>
+                  <a:spcBef>
+                    <a:spcPts val="500"/>
+                  </a:spcBef>
+                  <a:buFont typeface="Arial" panose="020B0604020202020204" pitchFamily="34" charset="0"/>
+                  <a:buChar char="•"/>
+                  <a:defRPr sz="1800" kern="1200">
+                    <a:solidFill>
+                      <a:schemeClr val="tx1"/>
+                    </a:solidFill>
+                    <a:latin typeface="+mn-lt"/>
+                    <a:ea typeface="+mn-ea"/>
+                    <a:cs typeface="+mn-cs"/>
+                  </a:defRPr>
+                </a:lvl7pPr>
+                <a:lvl8pPr marL="3429000" indent="-228600" algn="l" defTabSz="914400" rtl="0" eaLnBrk="1" latinLnBrk="0" hangingPunct="1">
+                  <a:lnSpc>
+                    <a:spcPct val="90000"/>
+                  </a:lnSpc>
+                  <a:spcBef>
+                    <a:spcPts val="500"/>
+                  </a:spcBef>
+                  <a:buFont typeface="Arial" panose="020B0604020202020204" pitchFamily="34" charset="0"/>
+                  <a:buChar char="•"/>
+                  <a:defRPr sz="1800" kern="1200">
+                    <a:solidFill>
+                      <a:schemeClr val="tx1"/>
+                    </a:solidFill>
+                    <a:latin typeface="+mn-lt"/>
+                    <a:ea typeface="+mn-ea"/>
+                    <a:cs typeface="+mn-cs"/>
+                  </a:defRPr>
+                </a:lvl8pPr>
+                <a:lvl9pPr marL="3886200" indent="-228600" algn="l" defTabSz="914400" rtl="0" eaLnBrk="1" latinLnBrk="0" hangingPunct="1">
+                  <a:lnSpc>
+                    <a:spcPct val="90000"/>
+                  </a:lnSpc>
+                  <a:spcBef>
+                    <a:spcPts val="500"/>
+                  </a:spcBef>
+                  <a:buFont typeface="Arial" panose="020B0604020202020204" pitchFamily="34" charset="0"/>
+                  <a:buChar char="•"/>
+                  <a:defRPr sz="1800" kern="1200">
+                    <a:solidFill>
+                      <a:schemeClr val="tx1"/>
+                    </a:solidFill>
+                    <a:latin typeface="+mn-lt"/>
+                    <a:ea typeface="+mn-ea"/>
+                    <a:cs typeface="+mn-cs"/>
+                  </a:defRPr>
+                </a:lvl9pPr>
+              </a:lstStyle>
+              <a:p>
+                <a:pPr algn="ctr"/>
+                <a:r>
+                  <a:rPr lang="en-GB" sz="4000" b="1" dirty="0">
+                    <a:solidFill>
+                      <a:srgbClr val="5C2C8F"/>
+                    </a:solidFill>
+                  </a:rPr>
+                  <a:t>Queries</a:t>
+                </a:r>
+              </a:p>
+            </p:txBody>
+          </p:sp>
+          <p:grpSp>
+            <p:nvGrpSpPr>
+              <p:cNvPr id="14" name="Group 13"/>
+              <p:cNvGrpSpPr/>
+              <p:nvPr/>
+            </p:nvGrpSpPr>
+            <p:grpSpPr>
+              <a:xfrm>
+                <a:off x="7603033" y="1511335"/>
+                <a:ext cx="3906727" cy="2726118"/>
+                <a:chOff x="8175593" y="3889139"/>
+                <a:chExt cx="2946006" cy="2055726"/>
+              </a:xfrm>
+            </p:grpSpPr>
+            <p:pic>
+              <p:nvPicPr>
+                <p:cNvPr id="15" name="Picture 2" descr="Afficher l'image d'origine"/>
+                <p:cNvPicPr>
+                  <a:picLocks noChangeAspect="1" noChangeArrowheads="1"/>
+                </p:cNvPicPr>
+                <p:nvPr/>
+              </p:nvPicPr>
+              <p:blipFill rotWithShape="1">
+                <a:blip r:embed="rId3">
+                  <a:extLst>
+                    <a:ext uri="{28A0092B-C50C-407E-A947-70E740481C1C}">
+                      <a14:useLocalDpi xmlns:a14="http://schemas.microsoft.com/office/drawing/2010/main" val="0"/>
+                    </a:ext>
+                  </a:extLst>
+                </a:blip>
+                <a:srcRect l="32074" t="2771" r="42741" b="65708"/>
+                <a:stretch/>
+              </p:blipFill>
+              <p:spPr bwMode="auto">
+                <a:xfrm>
+                  <a:off x="8175593" y="3909777"/>
+                  <a:ext cx="2306433" cy="2035088"/>
+                </a:xfrm>
+                <a:prstGeom prst="rect">
+                  <a:avLst/>
+                </a:prstGeom>
+                <a:noFill/>
+                <a:extLst>
+                  <a:ext uri="{909E8E84-426E-40DD-AFC4-6F175D3DCCD1}">
+                    <a14:hiddenFill xmlns:a14="http://schemas.microsoft.com/office/drawing/2010/main">
+                      <a:solidFill>
+                        <a:srgbClr val="FFFFFF"/>
+                      </a:solidFill>
+                    </a14:hiddenFill>
+                  </a:ext>
+                </a:extLst>
+              </p:spPr>
+            </p:pic>
+            <p:pic>
+              <p:nvPicPr>
+                <p:cNvPr id="16" name="Picture 15"/>
+                <p:cNvPicPr>
+                  <a:picLocks noChangeAspect="1"/>
+                </p:cNvPicPr>
+                <p:nvPr/>
+              </p:nvPicPr>
+              <p:blipFill>
+                <a:blip r:embed="rId4">
+                  <a:clrChange>
+                    <a:clrFrom>
+                      <a:srgbClr val="FFFFFF"/>
+                    </a:clrFrom>
+                    <a:clrTo>
+                      <a:srgbClr val="FFFFFF">
+                        <a:alpha val="0"/>
+                      </a:srgbClr>
+                    </a:clrTo>
+                  </a:clrChange>
+                  <a:extLst>
+                    <a:ext uri="{28A0092B-C50C-407E-A947-70E740481C1C}">
+                      <a14:useLocalDpi xmlns:a14="http://schemas.microsoft.com/office/drawing/2010/main" val="0"/>
+                    </a:ext>
+                  </a:extLst>
+                </a:blip>
+                <a:stretch>
+                  <a:fillRect/>
+                </a:stretch>
+              </p:blipFill>
+              <p:spPr>
+                <a:xfrm>
+                  <a:off x="9719906" y="3889139"/>
+                  <a:ext cx="1401693" cy="1216384"/>
+                </a:xfrm>
+                <a:prstGeom prst="rect">
+                  <a:avLst/>
+                </a:prstGeom>
+              </p:spPr>
+            </p:pic>
+          </p:grpSp>
+        </p:grpSp>
+        <p:sp>
+          <p:nvSpPr>
+            <p:cNvPr id="18" name="Content Placeholder 37"/>
+            <p:cNvSpPr txBox="1">
+              <a:spLocks/>
+            </p:cNvSpPr>
+            <p:nvPr/>
+          </p:nvSpPr>
+          <p:spPr>
+            <a:xfrm>
+              <a:off x="6625768" y="6050187"/>
+              <a:ext cx="4772696" cy="1071273"/>
+            </a:xfrm>
+            <a:prstGeom prst="rect">
+              <a:avLst/>
+            </a:prstGeom>
+          </p:spPr>
+          <p:txBody>
+            <a:bodyPr vert="horz" lIns="91440" tIns="45720" rIns="91440" bIns="45720" rtlCol="0" anchor="ctr">
+              <a:noAutofit/>
+            </a:bodyPr>
+            <a:lstStyle>
+              <a:lvl1pPr marL="0" indent="0" algn="l" defTabSz="914400" rtl="0" eaLnBrk="1" latinLnBrk="0" hangingPunct="1">
+                <a:lnSpc>
+                  <a:spcPct val="90000"/>
+                </a:lnSpc>
+                <a:spcBef>
+                  <a:spcPts val="1000"/>
+                </a:spcBef>
+                <a:buFont typeface="Arial" panose="020B0604020202020204" pitchFamily="34" charset="0"/>
+                <a:buNone/>
+                <a:defRPr sz="2800" kern="1200">
+                  <a:solidFill>
+                    <a:schemeClr val="tx1"/>
+                  </a:solidFill>
+                  <a:latin typeface="Segoe" panose="020B0502040504020203"/>
+                  <a:ea typeface="+mn-ea"/>
+                  <a:cs typeface="+mn-cs"/>
+                </a:defRPr>
+              </a:lvl1pPr>
+              <a:lvl2pPr marL="360363" indent="-360363" algn="l" defTabSz="914400" rtl="0" eaLnBrk="1" latinLnBrk="0" hangingPunct="1">
+                <a:lnSpc>
+                  <a:spcPct val="90000"/>
+                </a:lnSpc>
+                <a:spcBef>
+                  <a:spcPts val="500"/>
+                </a:spcBef>
+                <a:buFont typeface="Arial" panose="020B0604020202020204" pitchFamily="34" charset="0"/>
+                <a:buChar char="•"/>
+                <a:defRPr sz="2400" kern="1200">
+                  <a:solidFill>
+                    <a:schemeClr val="tx1"/>
+                  </a:solidFill>
+                  <a:latin typeface="Segoe" panose="020B0502040504020203"/>
+                  <a:ea typeface="+mn-ea"/>
+                  <a:cs typeface="+mn-cs"/>
+                </a:defRPr>
+              </a:lvl2pPr>
+              <a:lvl3pPr marL="628650" indent="-254000" algn="l" defTabSz="914400" rtl="0" eaLnBrk="1" latinLnBrk="0" hangingPunct="1">
+                <a:lnSpc>
+                  <a:spcPct val="90000"/>
+                </a:lnSpc>
+                <a:spcBef>
+                  <a:spcPts val="500"/>
+                </a:spcBef>
+                <a:buFontTx/>
+                <a:buChar char="–"/>
+                <a:tabLst>
+                  <a:tab pos="895350" algn="l"/>
+                </a:tabLst>
+                <a:defRPr sz="2400" kern="1200">
+                  <a:solidFill>
+                    <a:schemeClr val="tx1"/>
+                  </a:solidFill>
+                  <a:latin typeface="Segoe" panose="020B0502040504020203"/>
+                  <a:ea typeface="+mn-ea"/>
+                  <a:cs typeface="+mn-cs"/>
+                </a:defRPr>
+              </a:lvl3pPr>
+              <a:lvl4pPr marL="895350" indent="476250" algn="l" defTabSz="914400" rtl="0" eaLnBrk="1" latinLnBrk="0" hangingPunct="1">
+                <a:lnSpc>
+                  <a:spcPct val="90000"/>
+                </a:lnSpc>
+                <a:spcBef>
+                  <a:spcPts val="500"/>
+                </a:spcBef>
+                <a:buFont typeface="Arial" panose="020B0604020202020204" pitchFamily="34" charset="0"/>
+                <a:buNone/>
+                <a:defRPr sz="2400" kern="1200">
+                  <a:solidFill>
+                    <a:schemeClr val="tx1"/>
+                  </a:solidFill>
+                  <a:latin typeface="Segoe" panose="020B0502040504020203"/>
+                  <a:ea typeface="+mn-ea"/>
+                  <a:cs typeface="+mn-cs"/>
+                </a:defRPr>
+              </a:lvl4pPr>
+              <a:lvl5pPr marL="1828800" indent="0" algn="l" defTabSz="914400" rtl="0" eaLnBrk="1" latinLnBrk="0" hangingPunct="1">
+                <a:lnSpc>
+                  <a:spcPct val="90000"/>
+                </a:lnSpc>
+                <a:spcBef>
+                  <a:spcPts val="500"/>
+                </a:spcBef>
+                <a:buFont typeface="Arial" panose="020B0604020202020204" pitchFamily="34" charset="0"/>
+                <a:buNone/>
+                <a:defRPr sz="2400" kern="1200">
+                  <a:solidFill>
+                    <a:schemeClr val="tx1"/>
+                  </a:solidFill>
+                  <a:latin typeface="Segoe" panose="020B0502040504020203"/>
+                  <a:ea typeface="+mn-ea"/>
+                  <a:cs typeface="+mn-cs"/>
+                </a:defRPr>
+              </a:lvl5pPr>
+              <a:lvl6pPr marL="2514600" indent="-228600" algn="l" defTabSz="914400" rtl="0" eaLnBrk="1" latinLnBrk="0" hangingPunct="1">
+                <a:lnSpc>
+                  <a:spcPct val="90000"/>
+                </a:lnSpc>
+                <a:spcBef>
+                  <a:spcPts val="500"/>
+                </a:spcBef>
+                <a:buFont typeface="Arial" panose="020B0604020202020204" pitchFamily="34" charset="0"/>
+                <a:buChar char="•"/>
+                <a:defRPr sz="1800" kern="1200">
+                  <a:solidFill>
+                    <a:schemeClr val="tx1"/>
+                  </a:solidFill>
+                  <a:latin typeface="+mn-lt"/>
+                  <a:ea typeface="+mn-ea"/>
+                  <a:cs typeface="+mn-cs"/>
+                </a:defRPr>
+              </a:lvl6pPr>
+              <a:lvl7pPr marL="2971800" indent="-228600" algn="l" defTabSz="914400" rtl="0" eaLnBrk="1" latinLnBrk="0" hangingPunct="1">
+                <a:lnSpc>
+                  <a:spcPct val="90000"/>
+                </a:lnSpc>
+                <a:spcBef>
+                  <a:spcPts val="500"/>
+                </a:spcBef>
+                <a:buFont typeface="Arial" panose="020B0604020202020204" pitchFamily="34" charset="0"/>
+                <a:buChar char="•"/>
+                <a:defRPr sz="1800" kern="1200">
+                  <a:solidFill>
+                    <a:schemeClr val="tx1"/>
+                  </a:solidFill>
+                  <a:latin typeface="+mn-lt"/>
+                  <a:ea typeface="+mn-ea"/>
+                  <a:cs typeface="+mn-cs"/>
+                </a:defRPr>
+              </a:lvl7pPr>
+              <a:lvl8pPr marL="3429000" indent="-228600" algn="l" defTabSz="914400" rtl="0" eaLnBrk="1" latinLnBrk="0" hangingPunct="1">
+                <a:lnSpc>
+                  <a:spcPct val="90000"/>
+                </a:lnSpc>
+                <a:spcBef>
+                  <a:spcPts val="500"/>
+                </a:spcBef>
+                <a:buFont typeface="Arial" panose="020B0604020202020204" pitchFamily="34" charset="0"/>
+                <a:buChar char="•"/>
+                <a:defRPr sz="1800" kern="1200">
+                  <a:solidFill>
+                    <a:schemeClr val="tx1"/>
+                  </a:solidFill>
+                  <a:latin typeface="+mn-lt"/>
+                  <a:ea typeface="+mn-ea"/>
+                  <a:cs typeface="+mn-cs"/>
+                </a:defRPr>
+              </a:lvl8pPr>
+              <a:lvl9pPr marL="3886200" indent="-228600" algn="l" defTabSz="914400" rtl="0" eaLnBrk="1" latinLnBrk="0" hangingPunct="1">
+                <a:lnSpc>
+                  <a:spcPct val="90000"/>
+                </a:lnSpc>
+                <a:spcBef>
+                  <a:spcPts val="500"/>
+                </a:spcBef>
+                <a:buFont typeface="Arial" panose="020B0604020202020204" pitchFamily="34" charset="0"/>
+                <a:buChar char="•"/>
+                <a:defRPr sz="1800" kern="1200">
+                  <a:solidFill>
+                    <a:schemeClr val="tx1"/>
+                  </a:solidFill>
+                  <a:latin typeface="+mn-lt"/>
+                  <a:ea typeface="+mn-ea"/>
+                  <a:cs typeface="+mn-cs"/>
+                </a:defRPr>
+              </a:lvl9pPr>
+            </a:lstStyle>
+            <a:p>
+              <a:pPr algn="ctr"/>
+              <a:r>
+                <a:rPr lang="fr-FR" i="1" dirty="0">
+                  <a:solidFill>
+                    <a:schemeClr val="bg1">
+                      <a:lumMod val="65000"/>
+                    </a:schemeClr>
+                  </a:solidFill>
+                </a:rPr>
+                <a:t>Caches, modèles dénormalisés, lecture-seule</a:t>
+              </a:r>
+            </a:p>
+          </p:txBody>
+        </p:sp>
+      </p:grpSp>
+      <p:grpSp>
+        <p:nvGrpSpPr>
+          <p:cNvPr id="5" name="Group 4"/>
+          <p:cNvGrpSpPr/>
+          <p:nvPr/>
+        </p:nvGrpSpPr>
+        <p:grpSpPr>
+          <a:xfrm>
+            <a:off x="635000" y="2699662"/>
+            <a:ext cx="4772696" cy="3131991"/>
+            <a:chOff x="483492" y="2699662"/>
+            <a:chExt cx="4772696" cy="3131991"/>
+          </a:xfrm>
+        </p:grpSpPr>
+        <p:grpSp>
+          <p:nvGrpSpPr>
+            <p:cNvPr id="7" name="Group 6"/>
+            <p:cNvGrpSpPr/>
+            <p:nvPr/>
+          </p:nvGrpSpPr>
+          <p:grpSpPr>
+            <a:xfrm>
+              <a:off x="688075" y="2699662"/>
+              <a:ext cx="4471758" cy="1600973"/>
+              <a:chOff x="321536" y="3509038"/>
+              <a:chExt cx="8490000" cy="3039578"/>
+            </a:xfrm>
+          </p:grpSpPr>
+          <p:sp>
+            <p:nvSpPr>
+              <p:cNvPr id="8" name="Content Placeholder 37"/>
+              <p:cNvSpPr txBox="1">
+                <a:spLocks/>
+              </p:cNvSpPr>
+              <p:nvPr/>
+            </p:nvSpPr>
+            <p:spPr>
+              <a:xfrm>
+                <a:off x="3634349" y="4346191"/>
+                <a:ext cx="5177187" cy="2046561"/>
+              </a:xfrm>
+              <a:prstGeom prst="rect">
+                <a:avLst/>
+              </a:prstGeom>
+            </p:spPr>
+            <p:txBody>
+              <a:bodyPr vert="horz" lIns="91440" tIns="45720" rIns="91440" bIns="45720" rtlCol="0" anchor="ctr">
+                <a:noAutofit/>
+              </a:bodyPr>
+              <a:lstStyle>
+                <a:lvl1pPr marL="0" indent="0" algn="l" defTabSz="914400" rtl="0" eaLnBrk="1" latinLnBrk="0" hangingPunct="1">
+                  <a:lnSpc>
+                    <a:spcPct val="90000"/>
+                  </a:lnSpc>
+                  <a:spcBef>
+                    <a:spcPts val="1000"/>
+                  </a:spcBef>
+                  <a:buFont typeface="Arial" panose="020B0604020202020204" pitchFamily="34" charset="0"/>
+                  <a:buNone/>
+                  <a:defRPr sz="2800" kern="1200">
+                    <a:solidFill>
+                      <a:schemeClr val="tx1"/>
+                    </a:solidFill>
+                    <a:latin typeface="Segoe" panose="020B0502040504020203"/>
+                    <a:ea typeface="+mn-ea"/>
+                    <a:cs typeface="+mn-cs"/>
+                  </a:defRPr>
+                </a:lvl1pPr>
+                <a:lvl2pPr marL="360363" indent="-360363" algn="l" defTabSz="914400" rtl="0" eaLnBrk="1" latinLnBrk="0" hangingPunct="1">
+                  <a:lnSpc>
+                    <a:spcPct val="90000"/>
+                  </a:lnSpc>
+                  <a:spcBef>
+                    <a:spcPts val="500"/>
+                  </a:spcBef>
+                  <a:buFont typeface="Arial" panose="020B0604020202020204" pitchFamily="34" charset="0"/>
+                  <a:buChar char="•"/>
+                  <a:defRPr sz="2400" kern="1200">
+                    <a:solidFill>
+                      <a:schemeClr val="tx1"/>
+                    </a:solidFill>
+                    <a:latin typeface="Segoe" panose="020B0502040504020203"/>
+                    <a:ea typeface="+mn-ea"/>
+                    <a:cs typeface="+mn-cs"/>
+                  </a:defRPr>
+                </a:lvl2pPr>
+                <a:lvl3pPr marL="628650" indent="-254000" algn="l" defTabSz="914400" rtl="0" eaLnBrk="1" latinLnBrk="0" hangingPunct="1">
+                  <a:lnSpc>
+                    <a:spcPct val="90000"/>
+                  </a:lnSpc>
+                  <a:spcBef>
+                    <a:spcPts val="500"/>
+                  </a:spcBef>
+                  <a:buFontTx/>
+                  <a:buChar char="–"/>
+                  <a:tabLst>
+                    <a:tab pos="895350" algn="l"/>
+                  </a:tabLst>
+                  <a:defRPr sz="2400" kern="1200">
+                    <a:solidFill>
+                      <a:schemeClr val="tx1"/>
+                    </a:solidFill>
+                    <a:latin typeface="Segoe" panose="020B0502040504020203"/>
+                    <a:ea typeface="+mn-ea"/>
+                    <a:cs typeface="+mn-cs"/>
+                  </a:defRPr>
+                </a:lvl3pPr>
+                <a:lvl4pPr marL="895350" indent="476250" algn="l" defTabSz="914400" rtl="0" eaLnBrk="1" latinLnBrk="0" hangingPunct="1">
+                  <a:lnSpc>
+                    <a:spcPct val="90000"/>
+                  </a:lnSpc>
+                  <a:spcBef>
+                    <a:spcPts val="500"/>
+                  </a:spcBef>
+                  <a:buFont typeface="Arial" panose="020B0604020202020204" pitchFamily="34" charset="0"/>
+                  <a:buNone/>
+                  <a:defRPr sz="2400" kern="1200">
+                    <a:solidFill>
+                      <a:schemeClr val="tx1"/>
+                    </a:solidFill>
+                    <a:latin typeface="Segoe" panose="020B0502040504020203"/>
+                    <a:ea typeface="+mn-ea"/>
+                    <a:cs typeface="+mn-cs"/>
+                  </a:defRPr>
+                </a:lvl4pPr>
+                <a:lvl5pPr marL="1828800" indent="0" algn="l" defTabSz="914400" rtl="0" eaLnBrk="1" latinLnBrk="0" hangingPunct="1">
+                  <a:lnSpc>
+                    <a:spcPct val="90000"/>
+                  </a:lnSpc>
+                  <a:spcBef>
+                    <a:spcPts val="500"/>
+                  </a:spcBef>
+                  <a:buFont typeface="Arial" panose="020B0604020202020204" pitchFamily="34" charset="0"/>
+                  <a:buNone/>
+                  <a:defRPr sz="2400" kern="1200">
+                    <a:solidFill>
+                      <a:schemeClr val="tx1"/>
+                    </a:solidFill>
+                    <a:latin typeface="Segoe" panose="020B0502040504020203"/>
+                    <a:ea typeface="+mn-ea"/>
+                    <a:cs typeface="+mn-cs"/>
+                  </a:defRPr>
+                </a:lvl5pPr>
+                <a:lvl6pPr marL="2514600" indent="-228600" algn="l" defTabSz="914400" rtl="0" eaLnBrk="1" latinLnBrk="0" hangingPunct="1">
+                  <a:lnSpc>
+                    <a:spcPct val="90000"/>
+                  </a:lnSpc>
+                  <a:spcBef>
+                    <a:spcPts val="500"/>
+                  </a:spcBef>
+                  <a:buFont typeface="Arial" panose="020B0604020202020204" pitchFamily="34" charset="0"/>
+                  <a:buChar char="•"/>
+                  <a:defRPr sz="1800" kern="1200">
+                    <a:solidFill>
+                      <a:schemeClr val="tx1"/>
+                    </a:solidFill>
+                    <a:latin typeface="+mn-lt"/>
+                    <a:ea typeface="+mn-ea"/>
+                    <a:cs typeface="+mn-cs"/>
+                  </a:defRPr>
+                </a:lvl6pPr>
+                <a:lvl7pPr marL="2971800" indent="-228600" algn="l" defTabSz="914400" rtl="0" eaLnBrk="1" latinLnBrk="0" hangingPunct="1">
+                  <a:lnSpc>
+                    <a:spcPct val="90000"/>
+                  </a:lnSpc>
+                  <a:spcBef>
+                    <a:spcPts val="500"/>
+                  </a:spcBef>
+                  <a:buFont typeface="Arial" panose="020B0604020202020204" pitchFamily="34" charset="0"/>
+                  <a:buChar char="•"/>
+                  <a:defRPr sz="1800" kern="1200">
+                    <a:solidFill>
+                      <a:schemeClr val="tx1"/>
+                    </a:solidFill>
+                    <a:latin typeface="+mn-lt"/>
+                    <a:ea typeface="+mn-ea"/>
+                    <a:cs typeface="+mn-cs"/>
+                  </a:defRPr>
+                </a:lvl7pPr>
+                <a:lvl8pPr marL="3429000" indent="-228600" algn="l" defTabSz="914400" rtl="0" eaLnBrk="1" latinLnBrk="0" hangingPunct="1">
+                  <a:lnSpc>
+                    <a:spcPct val="90000"/>
+                  </a:lnSpc>
+                  <a:spcBef>
+                    <a:spcPts val="500"/>
+                  </a:spcBef>
+                  <a:buFont typeface="Arial" panose="020B0604020202020204" pitchFamily="34" charset="0"/>
+                  <a:buChar char="•"/>
+                  <a:defRPr sz="1800" kern="1200">
+                    <a:solidFill>
+                      <a:schemeClr val="tx1"/>
+                    </a:solidFill>
+                    <a:latin typeface="+mn-lt"/>
+                    <a:ea typeface="+mn-ea"/>
+                    <a:cs typeface="+mn-cs"/>
+                  </a:defRPr>
+                </a:lvl8pPr>
+                <a:lvl9pPr marL="3886200" indent="-228600" algn="l" defTabSz="914400" rtl="0" eaLnBrk="1" latinLnBrk="0" hangingPunct="1">
+                  <a:lnSpc>
+                    <a:spcPct val="90000"/>
+                  </a:lnSpc>
+                  <a:spcBef>
+                    <a:spcPts val="500"/>
+                  </a:spcBef>
+                  <a:buFont typeface="Arial" panose="020B0604020202020204" pitchFamily="34" charset="0"/>
+                  <a:buChar char="•"/>
+                  <a:defRPr sz="1800" kern="1200">
+                    <a:solidFill>
+                      <a:schemeClr val="tx1"/>
+                    </a:solidFill>
+                    <a:latin typeface="+mn-lt"/>
+                    <a:ea typeface="+mn-ea"/>
+                    <a:cs typeface="+mn-cs"/>
+                  </a:defRPr>
+                </a:lvl9pPr>
+              </a:lstStyle>
+              <a:p>
+                <a:pPr algn="ctr"/>
+                <a:r>
+                  <a:rPr lang="en-GB" sz="4000" b="1" dirty="0">
+                    <a:solidFill>
+                      <a:srgbClr val="0078D7"/>
+                    </a:solidFill>
+                  </a:rPr>
+                  <a:t>Commands</a:t>
+                </a:r>
+              </a:p>
+            </p:txBody>
+          </p:sp>
+          <p:grpSp>
+            <p:nvGrpSpPr>
+              <p:cNvPr id="9" name="Group 8"/>
+              <p:cNvGrpSpPr/>
+              <p:nvPr/>
+            </p:nvGrpSpPr>
+            <p:grpSpPr>
+              <a:xfrm>
+                <a:off x="321536" y="3509038"/>
+                <a:ext cx="3930745" cy="3039578"/>
+                <a:chOff x="7543371" y="1196676"/>
+                <a:chExt cx="2877381" cy="2225029"/>
+              </a:xfrm>
+            </p:grpSpPr>
+            <p:pic>
+              <p:nvPicPr>
+                <p:cNvPr id="10" name="Picture 2" descr="Afficher l'image d'origine"/>
+                <p:cNvPicPr>
+                  <a:picLocks noChangeAspect="1" noChangeArrowheads="1"/>
+                </p:cNvPicPr>
+                <p:nvPr/>
+              </p:nvPicPr>
+              <p:blipFill rotWithShape="1">
+                <a:blip r:embed="rId3">
+                  <a:extLst>
+                    <a:ext uri="{28A0092B-C50C-407E-A947-70E740481C1C}">
+                      <a14:useLocalDpi xmlns:a14="http://schemas.microsoft.com/office/drawing/2010/main" val="0"/>
+                    </a:ext>
+                  </a:extLst>
+                </a:blip>
+                <a:srcRect l="33259" t="63713" r="43482" b="1825"/>
+                <a:stretch/>
+              </p:blipFill>
+              <p:spPr bwMode="auto">
+                <a:xfrm>
+                  <a:off x="7543371" y="1196676"/>
+                  <a:ext cx="2130056" cy="2225029"/>
+                </a:xfrm>
+                <a:prstGeom prst="rect">
+                  <a:avLst/>
+                </a:prstGeom>
+                <a:noFill/>
+                <a:extLst>
+                  <a:ext uri="{909E8E84-426E-40DD-AFC4-6F175D3DCCD1}">
+                    <a14:hiddenFill xmlns:a14="http://schemas.microsoft.com/office/drawing/2010/main">
+                      <a:solidFill>
+                        <a:srgbClr val="FFFFFF"/>
+                      </a:solidFill>
+                    </a14:hiddenFill>
+                  </a:ext>
+                </a:extLst>
+              </p:spPr>
+            </p:pic>
+            <p:pic>
+              <p:nvPicPr>
+                <p:cNvPr id="11" name="Picture 10"/>
+                <p:cNvPicPr>
+                  <a:picLocks noChangeAspect="1"/>
+                </p:cNvPicPr>
+                <p:nvPr/>
+              </p:nvPicPr>
+              <p:blipFill>
+                <a:blip r:embed="rId5">
+                  <a:clrChange>
+                    <a:clrFrom>
+                      <a:srgbClr val="FFFFFF"/>
+                    </a:clrFrom>
+                    <a:clrTo>
+                      <a:srgbClr val="FFFFFF">
+                        <a:alpha val="0"/>
+                      </a:srgbClr>
+                    </a:clrTo>
+                  </a:clrChange>
+                  <a:extLst>
+                    <a:ext uri="{28A0092B-C50C-407E-A947-70E740481C1C}">
+                      <a14:useLocalDpi xmlns:a14="http://schemas.microsoft.com/office/drawing/2010/main" val="0"/>
+                    </a:ext>
+                  </a:extLst>
+                </a:blip>
+                <a:stretch>
+                  <a:fillRect/>
+                </a:stretch>
+              </p:blipFill>
+              <p:spPr>
+                <a:xfrm>
+                  <a:off x="9860075" y="1333971"/>
+                  <a:ext cx="560677" cy="586810"/>
+                </a:xfrm>
+                <a:prstGeom prst="rect">
+                  <a:avLst/>
+                </a:prstGeom>
+              </p:spPr>
+            </p:pic>
+          </p:grpSp>
+        </p:grpSp>
+        <p:sp>
+          <p:nvSpPr>
+            <p:cNvPr id="19" name="Content Placeholder 37"/>
+            <p:cNvSpPr txBox="1">
+              <a:spLocks/>
+            </p:cNvSpPr>
+            <p:nvPr/>
+          </p:nvSpPr>
+          <p:spPr>
+            <a:xfrm>
+              <a:off x="483492" y="4760380"/>
+              <a:ext cx="4772696" cy="1071273"/>
+            </a:xfrm>
+            <a:prstGeom prst="rect">
+              <a:avLst/>
+            </a:prstGeom>
+          </p:spPr>
+          <p:txBody>
+            <a:bodyPr vert="horz" lIns="91440" tIns="45720" rIns="91440" bIns="45720" rtlCol="0" anchor="ctr">
+              <a:noAutofit/>
+            </a:bodyPr>
+            <a:lstStyle>
+              <a:lvl1pPr marL="0" indent="0" algn="l" defTabSz="914400" rtl="0" eaLnBrk="1" latinLnBrk="0" hangingPunct="1">
+                <a:lnSpc>
+                  <a:spcPct val="90000"/>
+                </a:lnSpc>
+                <a:spcBef>
+                  <a:spcPts val="1000"/>
+                </a:spcBef>
+                <a:buFont typeface="Arial" panose="020B0604020202020204" pitchFamily="34" charset="0"/>
+                <a:buNone/>
+                <a:defRPr sz="2800" kern="1200">
+                  <a:solidFill>
+                    <a:schemeClr val="tx1"/>
+                  </a:solidFill>
+                  <a:latin typeface="Segoe" panose="020B0502040504020203"/>
+                  <a:ea typeface="+mn-ea"/>
+                  <a:cs typeface="+mn-cs"/>
+                </a:defRPr>
+              </a:lvl1pPr>
+              <a:lvl2pPr marL="360363" indent="-360363" algn="l" defTabSz="914400" rtl="0" eaLnBrk="1" latinLnBrk="0" hangingPunct="1">
+                <a:lnSpc>
+                  <a:spcPct val="90000"/>
+                </a:lnSpc>
+                <a:spcBef>
+                  <a:spcPts val="500"/>
+                </a:spcBef>
+                <a:buFont typeface="Arial" panose="020B0604020202020204" pitchFamily="34" charset="0"/>
+                <a:buChar char="•"/>
+                <a:defRPr sz="2400" kern="1200">
+                  <a:solidFill>
+                    <a:schemeClr val="tx1"/>
+                  </a:solidFill>
+                  <a:latin typeface="Segoe" panose="020B0502040504020203"/>
+                  <a:ea typeface="+mn-ea"/>
+                  <a:cs typeface="+mn-cs"/>
+                </a:defRPr>
+              </a:lvl2pPr>
+              <a:lvl3pPr marL="628650" indent="-254000" algn="l" defTabSz="914400" rtl="0" eaLnBrk="1" latinLnBrk="0" hangingPunct="1">
+                <a:lnSpc>
+                  <a:spcPct val="90000"/>
+                </a:lnSpc>
+                <a:spcBef>
+                  <a:spcPts val="500"/>
+                </a:spcBef>
+                <a:buFontTx/>
+                <a:buChar char="–"/>
+                <a:tabLst>
+                  <a:tab pos="895350" algn="l"/>
+                </a:tabLst>
+                <a:defRPr sz="2400" kern="1200">
+                  <a:solidFill>
+                    <a:schemeClr val="tx1"/>
+                  </a:solidFill>
+                  <a:latin typeface="Segoe" panose="020B0502040504020203"/>
+                  <a:ea typeface="+mn-ea"/>
+                  <a:cs typeface="+mn-cs"/>
+                </a:defRPr>
+              </a:lvl3pPr>
+              <a:lvl4pPr marL="895350" indent="476250" algn="l" defTabSz="914400" rtl="0" eaLnBrk="1" latinLnBrk="0" hangingPunct="1">
+                <a:lnSpc>
+                  <a:spcPct val="90000"/>
+                </a:lnSpc>
+                <a:spcBef>
+                  <a:spcPts val="500"/>
+                </a:spcBef>
+                <a:buFont typeface="Arial" panose="020B0604020202020204" pitchFamily="34" charset="0"/>
+                <a:buNone/>
+                <a:defRPr sz="2400" kern="1200">
+                  <a:solidFill>
+                    <a:schemeClr val="tx1"/>
+                  </a:solidFill>
+                  <a:latin typeface="Segoe" panose="020B0502040504020203"/>
+                  <a:ea typeface="+mn-ea"/>
+                  <a:cs typeface="+mn-cs"/>
+                </a:defRPr>
+              </a:lvl4pPr>
+              <a:lvl5pPr marL="1828800" indent="0" algn="l" defTabSz="914400" rtl="0" eaLnBrk="1" latinLnBrk="0" hangingPunct="1">
+                <a:lnSpc>
+                  <a:spcPct val="90000"/>
+                </a:lnSpc>
+                <a:spcBef>
+                  <a:spcPts val="500"/>
+                </a:spcBef>
+                <a:buFont typeface="Arial" panose="020B0604020202020204" pitchFamily="34" charset="0"/>
+                <a:buNone/>
+                <a:defRPr sz="2400" kern="1200">
+                  <a:solidFill>
+                    <a:schemeClr val="tx1"/>
+                  </a:solidFill>
+                  <a:latin typeface="Segoe" panose="020B0502040504020203"/>
+                  <a:ea typeface="+mn-ea"/>
+                  <a:cs typeface="+mn-cs"/>
+                </a:defRPr>
+              </a:lvl5pPr>
+              <a:lvl6pPr marL="2514600" indent="-228600" algn="l" defTabSz="914400" rtl="0" eaLnBrk="1" latinLnBrk="0" hangingPunct="1">
+                <a:lnSpc>
+                  <a:spcPct val="90000"/>
+                </a:lnSpc>
+                <a:spcBef>
+                  <a:spcPts val="500"/>
+                </a:spcBef>
+                <a:buFont typeface="Arial" panose="020B0604020202020204" pitchFamily="34" charset="0"/>
+                <a:buChar char="•"/>
+                <a:defRPr sz="1800" kern="1200">
+                  <a:solidFill>
+                    <a:schemeClr val="tx1"/>
+                  </a:solidFill>
+                  <a:latin typeface="+mn-lt"/>
+                  <a:ea typeface="+mn-ea"/>
+                  <a:cs typeface="+mn-cs"/>
+                </a:defRPr>
+              </a:lvl6pPr>
+              <a:lvl7pPr marL="2971800" indent="-228600" algn="l" defTabSz="914400" rtl="0" eaLnBrk="1" latinLnBrk="0" hangingPunct="1">
+                <a:lnSpc>
+                  <a:spcPct val="90000"/>
+                </a:lnSpc>
+                <a:spcBef>
+                  <a:spcPts val="500"/>
+                </a:spcBef>
+                <a:buFont typeface="Arial" panose="020B0604020202020204" pitchFamily="34" charset="0"/>
+                <a:buChar char="•"/>
+                <a:defRPr sz="1800" kern="1200">
+                  <a:solidFill>
+                    <a:schemeClr val="tx1"/>
+                  </a:solidFill>
+                  <a:latin typeface="+mn-lt"/>
+                  <a:ea typeface="+mn-ea"/>
+                  <a:cs typeface="+mn-cs"/>
+                </a:defRPr>
+              </a:lvl7pPr>
+              <a:lvl8pPr marL="3429000" indent="-228600" algn="l" defTabSz="914400" rtl="0" eaLnBrk="1" latinLnBrk="0" hangingPunct="1">
+                <a:lnSpc>
+                  <a:spcPct val="90000"/>
+                </a:lnSpc>
+                <a:spcBef>
+                  <a:spcPts val="500"/>
+                </a:spcBef>
+                <a:buFont typeface="Arial" panose="020B0604020202020204" pitchFamily="34" charset="0"/>
+                <a:buChar char="•"/>
+                <a:defRPr sz="1800" kern="1200">
+                  <a:solidFill>
+                    <a:schemeClr val="tx1"/>
+                  </a:solidFill>
+                  <a:latin typeface="+mn-lt"/>
+                  <a:ea typeface="+mn-ea"/>
+                  <a:cs typeface="+mn-cs"/>
+                </a:defRPr>
+              </a:lvl8pPr>
+              <a:lvl9pPr marL="3886200" indent="-228600" algn="l" defTabSz="914400" rtl="0" eaLnBrk="1" latinLnBrk="0" hangingPunct="1">
+                <a:lnSpc>
+                  <a:spcPct val="90000"/>
+                </a:lnSpc>
+                <a:spcBef>
+                  <a:spcPts val="500"/>
+                </a:spcBef>
+                <a:buFont typeface="Arial" panose="020B0604020202020204" pitchFamily="34" charset="0"/>
+                <a:buChar char="•"/>
+                <a:defRPr sz="1800" kern="1200">
+                  <a:solidFill>
+                    <a:schemeClr val="tx1"/>
+                  </a:solidFill>
+                  <a:latin typeface="+mn-lt"/>
+                  <a:ea typeface="+mn-ea"/>
+                  <a:cs typeface="+mn-cs"/>
+                </a:defRPr>
+              </a:lvl9pPr>
+            </a:lstStyle>
+            <a:p>
+              <a:pPr algn="ctr"/>
+              <a:r>
+                <a:rPr lang="fr-FR" i="1" dirty="0">
+                  <a:solidFill>
+                    <a:schemeClr val="bg1">
+                      <a:lumMod val="65000"/>
+                    </a:schemeClr>
+                  </a:solidFill>
+                </a:rPr>
+                <a:t>Transactionnel</a:t>
+              </a:r>
+            </a:p>
+            <a:p>
+              <a:pPr algn="ctr"/>
+              <a:r>
+                <a:rPr lang="fr-FR" i="1" dirty="0">
+                  <a:solidFill>
+                    <a:schemeClr val="bg1">
+                      <a:lumMod val="65000"/>
+                    </a:schemeClr>
+                  </a:solidFill>
+                </a:rPr>
+                <a:t>ACID</a:t>
+              </a:r>
+            </a:p>
+          </p:txBody>
+        </p:sp>
+      </p:grpSp>
+    </p:spTree>
+    <p:extLst>
+      <p:ext uri="{BB962C8B-B14F-4D97-AF65-F5344CB8AC3E}">
+        <p14:creationId xmlns:p14="http://schemas.microsoft.com/office/powerpoint/2010/main" val="3486945497"/>
+      </p:ext>
+    </p:extLst>
+  </p:cSld>
+  <p:clrMapOvr>
+    <a:masterClrMapping/>
+  </p:clrMapOvr>
+  <p:timing>
+    <p:tnLst>
+      <p:par>
+        <p:cTn id="1" dur="indefinite" restart="never" nodeType="tmRoot">
+          <p:childTnLst>
+            <p:seq concurrent="1" nextAc="seek">
+              <p:cTn id="2" dur="indefinite" nodeType="mainSeq">
+                <p:childTnLst>
+                  <p:par>
+                    <p:cTn id="3" fill="hold">
+                      <p:stCondLst>
+                        <p:cond delay="indefinite"/>
+                      </p:stCondLst>
+                      <p:childTnLst>
+                        <p:par>
+                          <p:cTn id="4" fill="hold">
+                            <p:stCondLst>
+                              <p:cond delay="0"/>
+                            </p:stCondLst>
+                            <p:childTnLst>
+                              <p:par>
+                                <p:cTn id="5" presetID="1" presetClass="entr" presetSubtype="0" fill="hold" grpId="0" nodeType="clickEffect">
+                                  <p:stCondLst>
+                                    <p:cond delay="0"/>
+                                  </p:stCondLst>
+                                  <p:childTnLst>
+                                    <p:set>
+                                      <p:cBhvr>
+                                        <p:cTn id="6" dur="1" fill="hold">
+                                          <p:stCondLst>
+                                            <p:cond delay="0"/>
+                                          </p:stCondLst>
+                                        </p:cTn>
+                                        <p:tgtEl>
+                                          <p:spTgt spid="38">
+                                            <p:txEl>
+                                              <p:pRg st="0" end="0"/>
+                                            </p:txEl>
+                                          </p:spTgt>
+                                        </p:tgtEl>
+                                        <p:attrNameLst>
+                                          <p:attrName>style.visibility</p:attrName>
+                                        </p:attrNameLst>
+                                      </p:cBhvr>
+                                      <p:to>
+                                        <p:strVal val="visible"/>
+                                      </p:to>
+                                    </p:set>
+                                  </p:childTnLst>
+                                </p:cTn>
+                              </p:par>
+                              <p:par>
+                                <p:cTn id="7" presetID="1" presetClass="entr" presetSubtype="0" fill="hold" nodeType="withEffect">
+                                  <p:stCondLst>
+                                    <p:cond delay="0"/>
+                                  </p:stCondLst>
+                                  <p:childTnLst>
+                                    <p:set>
+                                      <p:cBhvr>
+                                        <p:cTn id="8" dur="1" fill="hold">
+                                          <p:stCondLst>
+                                            <p:cond delay="0"/>
+                                          </p:stCondLst>
+                                        </p:cTn>
+                                        <p:tgtEl>
+                                          <p:spTgt spid="3"/>
+                                        </p:tgtEl>
+                                        <p:attrNameLst>
+                                          <p:attrName>style.visibility</p:attrName>
+                                        </p:attrNameLst>
+                                      </p:cBhvr>
+                                      <p:to>
+                                        <p:strVal val="visible"/>
+                                      </p:to>
+                                    </p:set>
+                                  </p:childTnLst>
+                                </p:cTn>
+                              </p:par>
+                            </p:childTnLst>
+                          </p:cTn>
+                        </p:par>
+                      </p:childTnLst>
+                    </p:cTn>
+                  </p:par>
+                  <p:par>
+                    <p:cTn id="9" fill="hold">
+                      <p:stCondLst>
+                        <p:cond delay="indefinite"/>
+                      </p:stCondLst>
+                      <p:childTnLst>
+                        <p:par>
+                          <p:cTn id="10" fill="hold">
+                            <p:stCondLst>
+                              <p:cond delay="0"/>
+                            </p:stCondLst>
+                            <p:childTnLst>
+                              <p:par>
+                                <p:cTn id="11" presetID="1" presetClass="entr" presetSubtype="0" fill="hold" nodeType="clickEffect">
+                                  <p:stCondLst>
+                                    <p:cond delay="0"/>
+                                  </p:stCondLst>
+                                  <p:childTnLst>
+                                    <p:set>
+                                      <p:cBhvr>
+                                        <p:cTn id="12" dur="1" fill="hold">
+                                          <p:stCondLst>
+                                            <p:cond delay="0"/>
+                                          </p:stCondLst>
+                                        </p:cTn>
+                                        <p:tgtEl>
+                                          <p:spTgt spid="5"/>
+                                        </p:tgtEl>
+                                        <p:attrNameLst>
+                                          <p:attrName>style.visibility</p:attrName>
+                                        </p:attrNameLst>
+                                      </p:cBhvr>
+                                      <p:to>
+                                        <p:strVal val="visible"/>
+                                      </p:to>
+                                    </p:set>
+                                  </p:childTnLst>
+                                </p:cTn>
+                              </p:par>
+                            </p:childTnLst>
+                          </p:cTn>
+                        </p:par>
+                      </p:childTnLst>
+                    </p:cTn>
+                  </p:par>
+                  <p:par>
+                    <p:cTn id="13" fill="hold">
+                      <p:stCondLst>
+                        <p:cond delay="indefinite"/>
+                      </p:stCondLst>
+                      <p:childTnLst>
+                        <p:par>
+                          <p:cTn id="14" fill="hold">
+                            <p:stCondLst>
+                              <p:cond delay="0"/>
+                            </p:stCondLst>
+                            <p:childTnLst>
+                              <p:par>
+                                <p:cTn id="15" presetID="1" presetClass="entr" presetSubtype="0" fill="hold" nodeType="clickEffect">
+                                  <p:stCondLst>
+                                    <p:cond delay="0"/>
+                                  </p:stCondLst>
+                                  <p:childTnLst>
+                                    <p:set>
+                                      <p:cBhvr>
+                                        <p:cTn id="16" dur="1" fill="hold">
+                                          <p:stCondLst>
+                                            <p:cond delay="0"/>
+                                          </p:stCondLst>
+                                        </p:cTn>
+                                        <p:tgtEl>
+                                          <p:spTgt spid="4"/>
+                                        </p:tgtEl>
+                                        <p:attrNameLst>
+                                          <p:attrName>style.visibility</p:attrName>
+                                        </p:attrNameLst>
+                                      </p:cBhvr>
+                                      <p:to>
+                                        <p:strVal val="visible"/>
+                                      </p:to>
+                                    </p:set>
+                                  </p:childTnLst>
+                                </p:cTn>
+                              </p:par>
+                            </p:childTnLst>
+                          </p:cTn>
+                        </p:par>
+                      </p:childTnLst>
+                    </p:cTn>
+                  </p:par>
+                </p:childTnLst>
+              </p:cTn>
+              <p:prevCondLst>
+                <p:cond evt="onPrev" delay="0">
+                  <p:tgtEl>
+                    <p:sldTgt/>
+                  </p:tgtEl>
+                </p:cond>
+              </p:prevCondLst>
+              <p:nextCondLst>
+                <p:cond evt="onNext" delay="0">
+                  <p:tgtEl>
+                    <p:sldTgt/>
+                  </p:tgtEl>
+                </p:cond>
+              </p:nextCondLst>
+            </p:seq>
+          </p:childTnLst>
+        </p:cTn>
+      </p:par>
+    </p:tnLst>
+    <p:bldLst>
+      <p:bldP spid="38" grpId="0" build="p"/>
+    </p:bldLst>
+  </p:timing>
+</p:sld>
+</file>
+
+<file path=ppt/slides/slide44.xml><?xml version="1.0" encoding="utf-8"?>
+<p:sld xmlns:a="http://schemas.openxmlformats.org/drawingml/2006/main" xmlns:r="http://schemas.openxmlformats.org/officeDocument/2006/relationships" xmlns:p="http://schemas.openxmlformats.org/presentationml/2006/main">
+  <p:cSld>
+    <p:spTree>
+      <p:nvGrpSpPr>
+        <p:cNvPr id="1" name=""/>
+        <p:cNvGrpSpPr/>
+        <p:nvPr/>
+      </p:nvGrpSpPr>
+      <p:grpSpPr>
+        <a:xfrm>
+          <a:off x="0" y="0"/>
+          <a:ext cx="0" cy="0"/>
+          <a:chOff x="0" y="0"/>
+          <a:chExt cx="0" cy="0"/>
+        </a:xfrm>
+      </p:grpSpPr>
+      <p:sp>
+        <p:nvSpPr>
+          <p:cNvPr id="3" name="Slide Number Placeholder 2"/>
+          <p:cNvSpPr>
+            <a:spLocks noGrp="1"/>
+          </p:cNvSpPr>
+          <p:nvPr>
+            <p:ph type="sldNum" sz="quarter" idx="4294967295"/>
+          </p:nvPr>
+        </p:nvSpPr>
+        <p:spPr>
+          <a:xfrm>
+            <a:off x="9448800" y="6492875"/>
+            <a:ext cx="2743200" cy="365125"/>
+          </a:xfrm>
+        </p:spPr>
+        <p:txBody>
+          <a:bodyPr/>
+          <a:lstStyle/>
+          <a:p>
+            <a:r>
+              <a:rPr lang="en-US"/>
+              <a:t>N° </a:t>
+            </a:r>
+            <a:fld id="{6BFFD774-5C5F-4855-9115-A9F49D34CCD3}" type="slidenum">
+              <a:rPr lang="en-US" smtClean="0"/>
+              <a:pPr/>
+              <a:t>44</a:t>
+            </a:fld>
+            <a:endParaRPr lang="en-US" dirty="0"/>
+          </a:p>
+        </p:txBody>
+      </p:sp>
+    </p:spTree>
+    <p:extLst>
+      <p:ext uri="{BB962C8B-B14F-4D97-AF65-F5344CB8AC3E}">
+        <p14:creationId xmlns:p14="http://schemas.microsoft.com/office/powerpoint/2010/main" val="3406228000"/>
+      </p:ext>
+    </p:extLst>
+  </p:cSld>
+  <p:clrMapOvr>
+    <a:masterClrMapping/>
+  </p:clrMapOvr>
+</p:sld>
+</file>
+
+<file path=ppt/slides/slide45.xml><?xml version="1.0" encoding="utf-8"?>
+<p:sld xmlns:a="http://schemas.openxmlformats.org/drawingml/2006/main" xmlns:r="http://schemas.openxmlformats.org/officeDocument/2006/relationships" xmlns:p="http://schemas.openxmlformats.org/presentationml/2006/main">
+  <p:cSld>
+    <p:spTree>
+      <p:nvGrpSpPr>
+        <p:cNvPr id="1" name=""/>
+        <p:cNvGrpSpPr/>
+        <p:nvPr/>
+      </p:nvGrpSpPr>
+      <p:grpSpPr>
+        <a:xfrm>
+          <a:off x="0" y="0"/>
+          <a:ext cx="0" cy="0"/>
+          <a:chOff x="0" y="0"/>
+          <a:chExt cx="0" cy="0"/>
+        </a:xfrm>
+      </p:grpSpPr>
+      <p:sp>
+        <p:nvSpPr>
           <p:cNvPr id="7" name="Text Placeholder 6"/>
           <p:cNvSpPr>
             <a:spLocks noGrp="1"/>
@@ -22286,7 +24956,7 @@
             <a:fld id="{6BFFD774-5C5F-4855-9115-A9F49D34CCD3}" type="slidenum">
               <a:rPr lang="en-US" smtClean="0"/>
               <a:pPr/>
-              <a:t>42</a:t>
+              <a:t>45</a:t>
             </a:fld>
             <a:endParaRPr lang="en-US" dirty="0"/>
           </a:p>
@@ -22305,7 +24975,7 @@
 </p:sld>
 </file>
 
-<file path=ppt/slides/slide43.xml><?xml version="1.0" encoding="utf-8"?>
+<file path=ppt/slides/slide46.xml><?xml version="1.0" encoding="utf-8"?>
 <p:sld xmlns:a="http://schemas.openxmlformats.org/drawingml/2006/main" xmlns:r="http://schemas.openxmlformats.org/officeDocument/2006/relationships" xmlns:p="http://schemas.openxmlformats.org/presentationml/2006/main">
   <p:cSld>
     <p:spTree>
@@ -22379,7 +25049,7 @@
             <a:fld id="{6BFFD774-5C5F-4855-9115-A9F49D34CCD3}" type="slidenum">
               <a:rPr lang="en-US" smtClean="0"/>
               <a:pPr/>
-              <a:t>43</a:t>
+              <a:t>46</a:t>
             </a:fld>
             <a:endParaRPr lang="en-US" dirty="0"/>
           </a:p>
@@ -22398,7 +25068,7 @@
 </p:sld>
 </file>
 
-<file path=ppt/slides/slide44.xml><?xml version="1.0" encoding="utf-8"?>
+<file path=ppt/slides/slide47.xml><?xml version="1.0" encoding="utf-8"?>
 <p:sld xmlns:a="http://schemas.openxmlformats.org/drawingml/2006/main" xmlns:r="http://schemas.openxmlformats.org/officeDocument/2006/relationships" xmlns:p="http://schemas.openxmlformats.org/presentationml/2006/main">
   <p:cSld>
     <p:spTree>
@@ -22934,7 +25604,7 @@
                 <a:latin typeface="Segoe" panose="020B0502040504020203"/>
               </a:rPr>
               <a:pPr/>
-              <a:t>44</a:t>
+              <a:t>47</a:t>
             </a:fld>
             <a:endParaRPr lang="en-US" dirty="0">
               <a:latin typeface="Segoe" panose="020B0502040504020203"/>
@@ -25110,15 +27780,6 @@
 </file>
 
 <file path=customXml/item1.xml><?xml version="1.0" encoding="utf-8"?>
-<?mso-contentType ?>
-<FormTemplates xmlns="http://schemas.microsoft.com/sharepoint/v3/contenttype/forms">
-  <Display>DocumentLibraryForm</Display>
-  <Edit>DocumentLibraryForm</Edit>
-  <New>DocumentLibraryForm</New>
-</FormTemplates>
-</file>
-
-<file path=customXml/item2.xml><?xml version="1.0" encoding="utf-8"?>
 <ct:contentTypeSchema xmlns:ct="http://schemas.microsoft.com/office/2006/metadata/contentType" xmlns:ma="http://schemas.microsoft.com/office/2006/metadata/properties/metaAttributes" ct:_="" ma:_="" ma:contentTypeName="Document" ma:contentTypeID="0x010100AA82F50041FC6E4EBC42A700831FF004" ma:contentTypeVersion="4" ma:contentTypeDescription="Crée un document." ma:contentTypeScope="" ma:versionID="4c6ec815f8017e8af2e42809d3015731">
   <xsd:schema xmlns:xsd="http://www.w3.org/2001/XMLSchema" xmlns:xs="http://www.w3.org/2001/XMLSchema" xmlns:p="http://schemas.microsoft.com/office/2006/metadata/properties" xmlns:ns2="fcc931a8-69fd-4b0b-b111-5aa2089df431" xmlns:ns3="248c3350-8f11-4d45-912e-72bccbb754b6" targetNamespace="http://schemas.microsoft.com/office/2006/metadata/properties" ma:root="true" ma:fieldsID="fa4f347ab2845ae3d60427d91a21d39e" ns2:_="" ns3:_="">
     <xsd:import namespace="fcc931a8-69fd-4b0b-b111-5aa2089df431"/>
@@ -25285,6 +27946,15 @@
 </ct:contentTypeSchema>
 </file>
 
+<file path=customXml/item2.xml><?xml version="1.0" encoding="utf-8"?>
+<?mso-contentType ?>
+<FormTemplates xmlns="http://schemas.microsoft.com/sharepoint/v3/contenttype/forms">
+  <Display>DocumentLibraryForm</Display>
+  <Edit>DocumentLibraryForm</Edit>
+  <New>DocumentLibraryForm</New>
+</FormTemplates>
+</file>
+
 <file path=customXml/item3.xml><?xml version="1.0" encoding="utf-8"?>
 <p:properties xmlns:p="http://schemas.microsoft.com/office/2006/metadata/properties" xmlns:xsi="http://www.w3.org/2001/XMLSchema-instance" xmlns:pc="http://schemas.microsoft.com/office/infopath/2007/PartnerControls">
   <documentManagement/>
@@ -25292,14 +27962,6 @@
 </file>
 
 <file path=customXml/itemProps1.xml><?xml version="1.0" encoding="utf-8"?>
-<ds:datastoreItem xmlns:ds="http://schemas.openxmlformats.org/officeDocument/2006/customXml" ds:itemID="{4F22CF26-F779-4CA8-9499-C5BCD4F56499}">
-  <ds:schemaRefs>
-    <ds:schemaRef ds:uri="http://schemas.microsoft.com/sharepoint/v3/contenttype/forms"/>
-  </ds:schemaRefs>
-</ds:datastoreItem>
-</file>
-
-<file path=customXml/itemProps2.xml><?xml version="1.0" encoding="utf-8"?>
 <ds:datastoreItem xmlns:ds="http://schemas.openxmlformats.org/officeDocument/2006/customXml" ds:itemID="{E040B343-BD03-44D2-93AA-0A352731B5B4}">
   <ds:schemaRefs>
     <ds:schemaRef ds:uri="http://schemas.microsoft.com/office/2006/metadata/contentType"/>
@@ -25318,17 +27980,25 @@
 </ds:datastoreItem>
 </file>
 
+<file path=customXml/itemProps2.xml><?xml version="1.0" encoding="utf-8"?>
+<ds:datastoreItem xmlns:ds="http://schemas.openxmlformats.org/officeDocument/2006/customXml" ds:itemID="{4F22CF26-F779-4CA8-9499-C5BCD4F56499}">
+  <ds:schemaRefs>
+    <ds:schemaRef ds:uri="http://schemas.microsoft.com/sharepoint/v3/contenttype/forms"/>
+  </ds:schemaRefs>
+</ds:datastoreItem>
+</file>
+
 <file path=customXml/itemProps3.xml><?xml version="1.0" encoding="utf-8"?>
 <ds:datastoreItem xmlns:ds="http://schemas.openxmlformats.org/officeDocument/2006/customXml" ds:itemID="{C65D9654-E48E-4D67-82FF-6ACD37149160}">
   <ds:schemaRefs>
-    <ds:schemaRef ds:uri="http://schemas.microsoft.com/office/2006/documentManagement/types"/>
-    <ds:schemaRef ds:uri="http://schemas.microsoft.com/office/infopath/2007/PartnerControls"/>
-    <ds:schemaRef ds:uri="http://purl.org/dc/elements/1.1/"/>
     <ds:schemaRef ds:uri="http://schemas.microsoft.com/office/2006/metadata/properties"/>
     <ds:schemaRef ds:uri="248c3350-8f11-4d45-912e-72bccbb754b6"/>
     <ds:schemaRef ds:uri="http://purl.org/dc/terms/"/>
+    <ds:schemaRef ds:uri="http://schemas.microsoft.com/office/2006/documentManagement/types"/>
     <ds:schemaRef ds:uri="http://schemas.openxmlformats.org/package/2006/metadata/core-properties"/>
     <ds:schemaRef ds:uri="fcc931a8-69fd-4b0b-b111-5aa2089df431"/>
+    <ds:schemaRef ds:uri="http://purl.org/dc/elements/1.1/"/>
+    <ds:schemaRef ds:uri="http://schemas.microsoft.com/office/infopath/2007/PartnerControls"/>
     <ds:schemaRef ds:uri="http://www.w3.org/XML/1998/namespace"/>
     <ds:schemaRef ds:uri="http://purl.org/dc/dcmitype/"/>
   </ds:schemaRefs>

</xml_diff>

<commit_message>
Improve last slide of the conclusion (to make it clearer)
</commit_message>
<xml_diff>
--- a/french/DecouvrirCQRSparLaPratique.pptx
+++ b/french/DecouvrirCQRSparLaPratique.pptx
@@ -22689,28 +22689,6 @@
       </p:sp>
       <p:sp>
         <p:nvSpPr>
-          <p:cNvPr id="41" name="Title 40"/>
-          <p:cNvSpPr>
-            <a:spLocks noGrp="1"/>
-          </p:cNvSpPr>
-          <p:nvPr>
-            <p:ph type="title"/>
-          </p:nvPr>
-        </p:nvSpPr>
-        <p:spPr/>
-        <p:txBody>
-          <a:bodyPr/>
-          <a:lstStyle/>
-          <a:p>
-            <a:r>
-              <a:rPr lang="fr-FR" dirty="0"/>
-              <a:t>Ce n’est pas non plus…</a:t>
-            </a:r>
-          </a:p>
-        </p:txBody>
-      </p:sp>
-      <p:sp>
-        <p:nvSpPr>
           <p:cNvPr id="29" name="Slide Number Placeholder 28"/>
           <p:cNvSpPr>
             <a:spLocks noGrp="1"/>
@@ -23525,10 +23503,10 @@
         </p:nvGrpSpPr>
         <p:grpSpPr>
           <a:xfrm>
-            <a:off x="6640820" y="2699662"/>
-            <a:ext cx="4772696" cy="3276593"/>
-            <a:chOff x="6625768" y="4456923"/>
-            <a:chExt cx="4772696" cy="2664537"/>
+            <a:off x="6663036" y="2699663"/>
+            <a:ext cx="4342518" cy="2340102"/>
+            <a:chOff x="6647984" y="4456923"/>
+            <a:chExt cx="4342518" cy="1902979"/>
           </a:xfrm>
         </p:grpSpPr>
         <p:grpSp>
@@ -23851,8 +23829,8 @@
           </p:nvSpPr>
           <p:spPr>
             <a:xfrm>
-              <a:off x="6625768" y="6050187"/>
-              <a:ext cx="4772696" cy="1071273"/>
+              <a:off x="6647984" y="5288629"/>
+              <a:ext cx="2157987" cy="1071273"/>
             </a:xfrm>
             <a:prstGeom prst="rect">
               <a:avLst/>
@@ -24032,7 +24010,7 @@
             <a:p>
               <a:pPr algn="ctr"/>
               <a:r>
-                <a:rPr lang="fr-FR" i="1" dirty="0">
+                <a:rPr lang="fr-FR" sz="2000" i="1" dirty="0">
                   <a:solidFill>
                     <a:schemeClr val="bg1">
                       <a:lumMod val="65000"/>
@@ -24053,10 +24031,10 @@
         </p:nvGrpSpPr>
         <p:grpSpPr>
           <a:xfrm>
-            <a:off x="635000" y="2699662"/>
-            <a:ext cx="4772696" cy="3131991"/>
-            <a:chOff x="483492" y="2699662"/>
-            <a:chExt cx="4772696" cy="3131991"/>
+            <a:off x="839583" y="2699662"/>
+            <a:ext cx="4471758" cy="2217064"/>
+            <a:chOff x="688075" y="2699662"/>
+            <a:chExt cx="4471758" cy="2217064"/>
           </a:xfrm>
         </p:grpSpPr>
         <p:grpSp>
@@ -24379,8 +24357,8 @@
           </p:nvSpPr>
           <p:spPr>
             <a:xfrm>
-              <a:off x="483492" y="4760380"/>
-              <a:ext cx="4772696" cy="1071273"/>
+              <a:off x="2774879" y="3845453"/>
+              <a:ext cx="1950907" cy="1071273"/>
             </a:xfrm>
             <a:prstGeom prst="rect">
               <a:avLst/>
@@ -24560,7 +24538,7 @@
             <a:p>
               <a:pPr algn="ctr"/>
               <a:r>
-                <a:rPr lang="fr-FR" i="1" dirty="0">
+                <a:rPr lang="fr-FR" sz="2000" i="1" dirty="0">
                   <a:solidFill>
                     <a:schemeClr val="bg1">
                       <a:lumMod val="65000"/>
@@ -24573,7 +24551,7 @@
             <a:p>
               <a:pPr algn="ctr"/>
               <a:r>
-                <a:rPr lang="fr-FR" i="1" dirty="0">
+                <a:rPr lang="fr-FR" sz="2000" i="1" dirty="0">
                   <a:solidFill>
                     <a:schemeClr val="bg1">
                       <a:lumMod val="65000"/>
@@ -24585,6 +24563,99 @@
             </a:p>
           </p:txBody>
         </p:sp>
+      </p:grpSp>
+      <p:grpSp>
+        <p:nvGrpSpPr>
+          <p:cNvPr id="6" name="Group 5"/>
+          <p:cNvGrpSpPr/>
+          <p:nvPr/>
+        </p:nvGrpSpPr>
+        <p:grpSpPr>
+          <a:xfrm>
+            <a:off x="5382345" y="5132584"/>
+            <a:ext cx="1149816" cy="1523235"/>
+            <a:chOff x="5382345" y="4613596"/>
+            <a:chExt cx="1149816" cy="1523235"/>
+          </a:xfrm>
+        </p:grpSpPr>
+        <p:pic>
+          <p:nvPicPr>
+            <p:cNvPr id="21" name="Picture 2" descr="directory"/>
+            <p:cNvPicPr>
+              <a:picLocks noChangeAspect="1" noChangeArrowheads="1"/>
+            </p:cNvPicPr>
+            <p:nvPr/>
+          </p:nvPicPr>
+          <p:blipFill rotWithShape="1">
+            <a:blip r:embed="rId6">
+              <a:extLst>
+                <a:ext uri="{28A0092B-C50C-407E-A947-70E740481C1C}">
+                  <a14:useLocalDpi xmlns:a14="http://schemas.microsoft.com/office/drawing/2010/main" val="0"/>
+                </a:ext>
+              </a:extLst>
+            </a:blip>
+            <a:srcRect l="23372" t="45424" r="67612" b="41425"/>
+            <a:stretch/>
+          </p:blipFill>
+          <p:spPr bwMode="auto">
+            <a:xfrm>
+              <a:off x="5382345" y="4613596"/>
+              <a:ext cx="1144004" cy="1218057"/>
+            </a:xfrm>
+            <a:prstGeom prst="rect">
+              <a:avLst/>
+            </a:prstGeom>
+            <a:noFill/>
+            <a:extLst>
+              <a:ext uri="{909E8E84-426E-40DD-AFC4-6F175D3DCCD1}">
+                <a14:hiddenFill xmlns:a14="http://schemas.microsoft.com/office/drawing/2010/main">
+                  <a:solidFill>
+                    <a:srgbClr val="FFFFFF"/>
+                  </a:solidFill>
+                </a14:hiddenFill>
+              </a:ext>
+            </a:extLst>
+          </p:spPr>
+        </p:pic>
+        <p:pic>
+          <p:nvPicPr>
+            <p:cNvPr id="31" name="Picture 2" descr="Afficher l'image d'origine"/>
+            <p:cNvPicPr>
+              <a:picLocks noChangeAspect="1" noChangeArrowheads="1"/>
+            </p:cNvPicPr>
+            <p:nvPr/>
+          </p:nvPicPr>
+          <p:blipFill rotWithShape="1">
+            <a:blip r:embed="rId3">
+              <a:extLst>
+                <a:ext uri="{28A0092B-C50C-407E-A947-70E740481C1C}">
+                  <a14:useLocalDpi xmlns:a14="http://schemas.microsoft.com/office/drawing/2010/main" val="0"/>
+                </a:ext>
+              </a:extLst>
+            </a:blip>
+            <a:srcRect l="18527" t="18578" r="67366" b="75486"/>
+            <a:stretch/>
+          </p:blipFill>
+          <p:spPr bwMode="auto">
+            <a:xfrm>
+              <a:off x="5407696" y="5803198"/>
+              <a:ext cx="1124465" cy="333633"/>
+            </a:xfrm>
+            <a:prstGeom prst="rect">
+              <a:avLst/>
+            </a:prstGeom>
+            <a:noFill/>
+            <a:extLst>
+              <a:ext uri="{909E8E84-426E-40DD-AFC4-6F175D3DCCD1}">
+                <a14:hiddenFill xmlns:a14="http://schemas.microsoft.com/office/drawing/2010/main">
+                  <a:solidFill>
+                    <a:srgbClr val="FFFFFF"/>
+                  </a:solidFill>
+                </a14:hiddenFill>
+              </a:ext>
+            </a:extLst>
+          </p:spPr>
+        </p:pic>
       </p:grpSp>
     </p:spTree>
     <p:extLst>
@@ -24752,6 +24823,51 @@
                                         </p:cTn>
                                         <p:tgtEl>
                                           <p:spTgt spid="4"/>
+                                        </p:tgtEl>
+                                        <p:attrNameLst>
+                                          <p:attrName>style.visibility</p:attrName>
+                                        </p:attrNameLst>
+                                      </p:cBhvr>
+                                      <p:to>
+                                        <p:strVal val="visible"/>
+                                      </p:to>
+                                    </p:set>
+                                  </p:childTnLst>
+                                </p:cTn>
+                              </p:par>
+                            </p:childTnLst>
+                          </p:cTn>
+                        </p:par>
+                      </p:childTnLst>
+                    </p:cTn>
+                  </p:par>
+                  <p:par>
+                    <p:cTn id="17" fill="hold">
+                      <p:stCondLst>
+                        <p:cond delay="indefinite"/>
+                      </p:stCondLst>
+                      <p:childTnLst>
+                        <p:par>
+                          <p:cTn id="18" fill="hold">
+                            <p:stCondLst>
+                              <p:cond delay="0"/>
+                            </p:stCondLst>
+                            <p:childTnLst>
+                              <p:par>
+                                <p:cTn id="19" presetID="1" presetClass="entr" presetSubtype="0" fill="hold" nodeType="clickEffect">
+                                  <p:stCondLst>
+                                    <p:cond delay="0"/>
+                                  </p:stCondLst>
+                                  <p:childTnLst>
+                                    <p:set>
+                                      <p:cBhvr>
+                                        <p:cTn id="20" dur="1" fill="hold">
+                                          <p:stCondLst>
+                                            <p:cond delay="0"/>
+                                          </p:stCondLst>
+                                        </p:cTn>
+                                        <p:tgtEl>
+                                          <p:spTgt spid="6"/>
                                         </p:tgtEl>
                                         <p:attrNameLst>
                                           <p:attrName>style.visibility</p:attrName>
@@ -27780,6 +27896,15 @@
 </file>
 
 <file path=customXml/item1.xml><?xml version="1.0" encoding="utf-8"?>
+<?mso-contentType ?>
+<FormTemplates xmlns="http://schemas.microsoft.com/sharepoint/v3/contenttype/forms">
+  <Display>DocumentLibraryForm</Display>
+  <Edit>DocumentLibraryForm</Edit>
+  <New>DocumentLibraryForm</New>
+</FormTemplates>
+</file>
+
+<file path=customXml/item2.xml><?xml version="1.0" encoding="utf-8"?>
 <ct:contentTypeSchema xmlns:ct="http://schemas.microsoft.com/office/2006/metadata/contentType" xmlns:ma="http://schemas.microsoft.com/office/2006/metadata/properties/metaAttributes" ct:_="" ma:_="" ma:contentTypeName="Document" ma:contentTypeID="0x010100AA82F50041FC6E4EBC42A700831FF004" ma:contentTypeVersion="4" ma:contentTypeDescription="Crée un document." ma:contentTypeScope="" ma:versionID="4c6ec815f8017e8af2e42809d3015731">
   <xsd:schema xmlns:xsd="http://www.w3.org/2001/XMLSchema" xmlns:xs="http://www.w3.org/2001/XMLSchema" xmlns:p="http://schemas.microsoft.com/office/2006/metadata/properties" xmlns:ns2="fcc931a8-69fd-4b0b-b111-5aa2089df431" xmlns:ns3="248c3350-8f11-4d45-912e-72bccbb754b6" targetNamespace="http://schemas.microsoft.com/office/2006/metadata/properties" ma:root="true" ma:fieldsID="fa4f347ab2845ae3d60427d91a21d39e" ns2:_="" ns3:_="">
     <xsd:import namespace="fcc931a8-69fd-4b0b-b111-5aa2089df431"/>
@@ -27946,15 +28071,6 @@
 </ct:contentTypeSchema>
 </file>
 
-<file path=customXml/item2.xml><?xml version="1.0" encoding="utf-8"?>
-<?mso-contentType ?>
-<FormTemplates xmlns="http://schemas.microsoft.com/sharepoint/v3/contenttype/forms">
-  <Display>DocumentLibraryForm</Display>
-  <Edit>DocumentLibraryForm</Edit>
-  <New>DocumentLibraryForm</New>
-</FormTemplates>
-</file>
-
 <file path=customXml/item3.xml><?xml version="1.0" encoding="utf-8"?>
 <p:properties xmlns:p="http://schemas.microsoft.com/office/2006/metadata/properties" xmlns:xsi="http://www.w3.org/2001/XMLSchema-instance" xmlns:pc="http://schemas.microsoft.com/office/infopath/2007/PartnerControls">
   <documentManagement/>
@@ -27962,6 +28078,14 @@
 </file>
 
 <file path=customXml/itemProps1.xml><?xml version="1.0" encoding="utf-8"?>
+<ds:datastoreItem xmlns:ds="http://schemas.openxmlformats.org/officeDocument/2006/customXml" ds:itemID="{4F22CF26-F779-4CA8-9499-C5BCD4F56499}">
+  <ds:schemaRefs>
+    <ds:schemaRef ds:uri="http://schemas.microsoft.com/sharepoint/v3/contenttype/forms"/>
+  </ds:schemaRefs>
+</ds:datastoreItem>
+</file>
+
+<file path=customXml/itemProps2.xml><?xml version="1.0" encoding="utf-8"?>
 <ds:datastoreItem xmlns:ds="http://schemas.openxmlformats.org/officeDocument/2006/customXml" ds:itemID="{E040B343-BD03-44D2-93AA-0A352731B5B4}">
   <ds:schemaRefs>
     <ds:schemaRef ds:uri="http://schemas.microsoft.com/office/2006/metadata/contentType"/>
@@ -27976,14 +28100,6 @@
     <ds:schemaRef ds:uri="http://purl.org/dc/elements/1.1/"/>
     <ds:schemaRef ds:uri="http://purl.org/dc/terms/"/>
     <ds:schemaRef ds:uri="http://schemas.microsoft.com/internal/obd"/>
-  </ds:schemaRefs>
-</ds:datastoreItem>
-</file>
-
-<file path=customXml/itemProps2.xml><?xml version="1.0" encoding="utf-8"?>
-<ds:datastoreItem xmlns:ds="http://schemas.openxmlformats.org/officeDocument/2006/customXml" ds:itemID="{4F22CF26-F779-4CA8-9499-C5BCD4F56499}">
-  <ds:schemaRefs>
-    <ds:schemaRef ds:uri="http://schemas.microsoft.com/sharepoint/v3/contenttype/forms"/>
   </ds:schemaRefs>
 </ds:datastoreItem>
 </file>

</xml_diff>